<commit_message>
Update P1-Discrete Time Markov Chains.pptx
</commit_message>
<xml_diff>
--- a/projects/DTMC/P1-Discrete Time Markov Chains.pptx
+++ b/projects/DTMC/P1-Discrete Time Markov Chains.pptx
@@ -208,7 +208,7 @@
           <a:p>
             <a:fld id="{A0C1F70C-5BF6-43D2-96A0-6511110BD68E}" type="datetimeFigureOut">
               <a:rPr lang="en-US" smtClean="0"/>
-              <a:t>11/30/2020</a:t>
+              <a:t>12/1/2020</a:t>
             </a:fld>
             <a:endParaRPr lang="en-US"/>
           </a:p>
@@ -2370,7 +2370,7 @@
           <a:p>
             <a:fld id="{D56A5F13-4F86-5646-9B99-A42325757066}" type="datetime1">
               <a:rPr lang="en-US" smtClean="0"/>
-              <a:t>11/30/2020</a:t>
+              <a:t>12/1/2020</a:t>
             </a:fld>
             <a:endParaRPr lang="en-US"/>
           </a:p>
@@ -2659,7 +2659,7 @@
           <a:p>
             <a:fld id="{34C8E77E-B710-C741-B9C3-BDFAF2BD28F5}" type="datetime1">
               <a:rPr lang="en-US" smtClean="0"/>
-              <a:t>11/30/2020</a:t>
+              <a:t>12/1/2020</a:t>
             </a:fld>
             <a:endParaRPr lang="en-US"/>
           </a:p>
@@ -2948,7 +2948,7 @@
           <a:p>
             <a:fld id="{3CC70E32-BC87-A748-B8DC-BBE1A8E155BB}" type="datetime1">
               <a:rPr lang="en-US" smtClean="0"/>
-              <a:t>11/30/2020</a:t>
+              <a:t>12/1/2020</a:t>
             </a:fld>
             <a:endParaRPr lang="en-US"/>
           </a:p>
@@ -3237,7 +3237,7 @@
           <a:p>
             <a:fld id="{FF80D806-2732-D74C-AA54-685EF616F24A}" type="datetime1">
               <a:rPr lang="en-US" smtClean="0"/>
-              <a:t>11/30/2020</a:t>
+              <a:t>12/1/2020</a:t>
             </a:fld>
             <a:endParaRPr lang="en-US"/>
           </a:p>
@@ -3474,7 +3474,7 @@
           <a:p>
             <a:fld id="{7EE62EE2-D39B-DB40-8504-5F31AB3A7B1B}" type="datetime1">
               <a:rPr lang="en-US" smtClean="0"/>
-              <a:t>11/30/2020</a:t>
+              <a:t>12/1/2020</a:t>
             </a:fld>
             <a:endParaRPr lang="en-US"/>
           </a:p>
@@ -3931,7 +3931,7 @@
           <a:p>
             <a:fld id="{F2C6AE98-BAC0-8443-BBA0-C97A4F30D31A}" type="datetime1">
               <a:rPr lang="en-US" smtClean="0"/>
-              <a:t>11/30/2020</a:t>
+              <a:t>12/1/2020</a:t>
             </a:fld>
             <a:endParaRPr lang="en-US"/>
           </a:p>
@@ -4199,7 +4199,7 @@
           <a:p>
             <a:fld id="{88DBBF51-3929-3A49-BA7D-3AF73092A0AD}" type="datetime1">
               <a:rPr lang="en-US" smtClean="0"/>
-              <a:t>11/30/2020</a:t>
+              <a:t>12/1/2020</a:t>
             </a:fld>
             <a:endParaRPr lang="en-US"/>
           </a:p>
@@ -4397,7 +4397,7 @@
           <a:p>
             <a:fld id="{36C5C674-12AF-41F5-BDE5-1132B29F8CB8}" type="datetime1">
               <a:rPr lang="en-US" smtClean="0"/>
-              <a:t>11/30/2020</a:t>
+              <a:t>12/1/2020</a:t>
             </a:fld>
             <a:endParaRPr lang="en-US"/>
           </a:p>
@@ -6770,7 +6770,7 @@
           <a:p>
             <a:fld id="{3D457031-A04F-0040-B79E-439CA9E02781}" type="datetime1">
               <a:rPr lang="en-US" smtClean="0"/>
-              <a:t>11/30/2020</a:t>
+              <a:t>12/1/2020</a:t>
             </a:fld>
             <a:endParaRPr lang="en-US"/>
           </a:p>
@@ -7020,7 +7020,7 @@
           <a:p>
             <a:fld id="{641269E8-56DE-E044-B0E5-B498755A2633}" type="datetime1">
               <a:rPr lang="en-US" smtClean="0"/>
-              <a:t>11/30/2020</a:t>
+              <a:t>12/1/2020</a:t>
             </a:fld>
             <a:endParaRPr lang="en-US"/>
           </a:p>
@@ -7406,7 +7406,7 @@
           <a:p>
             <a:fld id="{219B2A40-E9E6-7E49-9EE5-F8C2FAB652F4}" type="datetime1">
               <a:rPr lang="en-US" smtClean="0"/>
-              <a:t>11/30/2020</a:t>
+              <a:t>12/1/2020</a:t>
             </a:fld>
             <a:endParaRPr lang="en-US"/>
           </a:p>
@@ -7666,7 +7666,7 @@
           <a:p>
             <a:fld id="{08D12B45-3253-4A45-B8F9-2E00FEB0C480}" type="datetime1">
               <a:rPr lang="en-US" smtClean="0"/>
-              <a:t>11/30/2020</a:t>
+              <a:t>12/1/2020</a:t>
             </a:fld>
             <a:endParaRPr lang="en-US"/>
           </a:p>
@@ -9775,8 +9775,8 @@
           <a:chExt cx="0" cy="0"/>
         </a:xfrm>
       </p:grpSpPr>
-      <mc:AlternateContent xmlns:mc="http://schemas.openxmlformats.org/markup-compatibility/2006" xmlns:a14="http://schemas.microsoft.com/office/drawing/2010/main">
-        <mc:Choice Requires="a14">
+      <mc:AlternateContent xmlns:mc="http://schemas.openxmlformats.org/markup-compatibility/2006">
+        <mc:Choice xmlns:a14="http://schemas.microsoft.com/office/drawing/2010/main" Requires="a14">
           <p:sp>
             <p:nvSpPr>
               <p:cNvPr id="2" name="Text Placeholder 1">
@@ -9796,7 +9796,7 @@
             <p:spPr>
               <a:xfrm>
                 <a:off x="478369" y="1225486"/>
-                <a:ext cx="11474451" cy="4348883"/>
+                <a:ext cx="11474451" cy="5246564"/>
               </a:xfrm>
             </p:spPr>
             <p:txBody>
@@ -10023,6 +10023,31 @@
                 </a:r>
               </a:p>
               <a:p>
+                <a:pPr marL="457200" indent="-457200">
+                  <a:buFont typeface="+mj-lt"/>
+                  <a:buAutoNum type="arabicPeriod"/>
+                </a:pPr>
+                <a:r>
+                  <a:rPr lang="en-US" dirty="0"/>
+                  <a:t>Extra - In the case </a:t>
+                </a:r>
+                <a:r>
+                  <a:rPr lang="en-US"/>
+                  <a:t>of an intermittent failure, </a:t>
+                </a:r>
+                <a:r>
+                  <a:rPr lang="en-US" dirty="0"/>
+                  <a:t>what is the probability of failure masking? </a:t>
+                </a:r>
+              </a:p>
+              <a:p>
+                <a:pPr marL="457200" indent="-457200">
+                  <a:buFont typeface="+mj-lt"/>
+                  <a:buAutoNum type="arabicPeriod"/>
+                </a:pPr>
+                <a:endParaRPr lang="en-US" dirty="0"/>
+              </a:p>
+              <a:p>
                 <a:pPr marL="697194" lvl="1" indent="-457200">
                   <a:buFont typeface="+mj-lt"/>
                   <a:buAutoNum type="arabicPeriod"/>
@@ -10032,7 +10057,7 @@
             </p:txBody>
           </p:sp>
         </mc:Choice>
-        <mc:Fallback xmlns="">
+        <mc:Fallback>
           <p:sp>
             <p:nvSpPr>
               <p:cNvPr id="2" name="Text Placeholder 1">
@@ -10052,12 +10077,12 @@
             <p:spPr>
               <a:xfrm>
                 <a:off x="478369" y="1225486"/>
-                <a:ext cx="11474451" cy="4348883"/>
+                <a:ext cx="11474451" cy="5246564"/>
               </a:xfrm>
               <a:blipFill>
                 <a:blip r:embed="rId2"/>
                 <a:stretch>
-                  <a:fillRect l="-1275" t="-1262"/>
+                  <a:fillRect l="-1275" t="-1045"/>
                 </a:stretch>
               </a:blipFill>
             </p:spPr>
@@ -14381,8 +14406,8 @@
           </a:fontRef>
         </p:style>
       </p:cxnSp>
-      <mc:AlternateContent xmlns:mc="http://schemas.openxmlformats.org/markup-compatibility/2006">
-        <mc:Choice xmlns:a14="http://schemas.microsoft.com/office/drawing/2010/main" Requires="a14">
+      <mc:AlternateContent xmlns:mc="http://schemas.openxmlformats.org/markup-compatibility/2006" xmlns:a14="http://schemas.microsoft.com/office/drawing/2010/main">
+        <mc:Choice Requires="a14">
           <p:graphicFrame>
             <p:nvGraphicFramePr>
               <p:cNvPr id="132" name="Table 132">
@@ -18936,7 +18961,7 @@
             </a:graphic>
           </p:graphicFrame>
         </mc:Choice>
-        <mc:Fallback>
+        <mc:Fallback xmlns="">
           <p:graphicFrame>
             <p:nvGraphicFramePr>
               <p:cNvPr id="132" name="Table 132">

</xml_diff>

<commit_message>
Ergodic Markov Chain - Supervisory component
also fixed the Transition Matrix
</commit_message>
<xml_diff>
--- a/projects/DTMC/P1-Discrete Time Markov Chains.pptx
+++ b/projects/DTMC/P1-Discrete Time Markov Chains.pptx
@@ -5,7 +5,7 @@
     <p:sldMasterId id="2147483660" r:id="rId1"/>
   </p:sldMasterIdLst>
   <p:notesMasterIdLst>
-    <p:notesMasterId r:id="rId14"/>
+    <p:notesMasterId r:id="rId15"/>
   </p:notesMasterIdLst>
   <p:sldIdLst>
     <p:sldId id="256" r:id="rId2"/>
@@ -14,12 +14,13 @@
     <p:sldId id="441" r:id="rId5"/>
     <p:sldId id="442" r:id="rId6"/>
     <p:sldId id="443" r:id="rId7"/>
-    <p:sldId id="450" r:id="rId8"/>
+    <p:sldId id="451" r:id="rId8"/>
     <p:sldId id="447" r:id="rId9"/>
     <p:sldId id="449" r:id="rId10"/>
     <p:sldId id="446" r:id="rId11"/>
     <p:sldId id="445" r:id="rId12"/>
     <p:sldId id="267" r:id="rId13"/>
+    <p:sldId id="257" r:id="rId14"/>
   </p:sldIdLst>
   <p:sldSz cx="12192000" cy="6858000"/>
   <p:notesSz cx="6858000" cy="9144000"/>
@@ -208,7 +209,7 @@
           <a:p>
             <a:fld id="{A0C1F70C-5BF6-43D2-96A0-6511110BD68E}" type="datetimeFigureOut">
               <a:rPr lang="en-US" smtClean="0"/>
-              <a:t>12/1/2020</a:t>
+              <a:t>12/2/2020</a:t>
             </a:fld>
             <a:endParaRPr lang="en-US"/>
           </a:p>
@@ -2370,7 +2371,7 @@
           <a:p>
             <a:fld id="{D56A5F13-4F86-5646-9B99-A42325757066}" type="datetime1">
               <a:rPr lang="en-US" smtClean="0"/>
-              <a:t>12/1/2020</a:t>
+              <a:t>12/2/2020</a:t>
             </a:fld>
             <a:endParaRPr lang="en-US"/>
           </a:p>
@@ -2659,7 +2660,7 @@
           <a:p>
             <a:fld id="{34C8E77E-B710-C741-B9C3-BDFAF2BD28F5}" type="datetime1">
               <a:rPr lang="en-US" smtClean="0"/>
-              <a:t>12/1/2020</a:t>
+              <a:t>12/2/2020</a:t>
             </a:fld>
             <a:endParaRPr lang="en-US"/>
           </a:p>
@@ -2948,7 +2949,7 @@
           <a:p>
             <a:fld id="{3CC70E32-BC87-A748-B8DC-BBE1A8E155BB}" type="datetime1">
               <a:rPr lang="en-US" smtClean="0"/>
-              <a:t>12/1/2020</a:t>
+              <a:t>12/2/2020</a:t>
             </a:fld>
             <a:endParaRPr lang="en-US"/>
           </a:p>
@@ -3237,7 +3238,7 @@
           <a:p>
             <a:fld id="{FF80D806-2732-D74C-AA54-685EF616F24A}" type="datetime1">
               <a:rPr lang="en-US" smtClean="0"/>
-              <a:t>12/1/2020</a:t>
+              <a:t>12/2/2020</a:t>
             </a:fld>
             <a:endParaRPr lang="en-US"/>
           </a:p>
@@ -3474,7 +3475,7 @@
           <a:p>
             <a:fld id="{7EE62EE2-D39B-DB40-8504-5F31AB3A7B1B}" type="datetime1">
               <a:rPr lang="en-US" smtClean="0"/>
-              <a:t>12/1/2020</a:t>
+              <a:t>12/2/2020</a:t>
             </a:fld>
             <a:endParaRPr lang="en-US"/>
           </a:p>
@@ -3931,7 +3932,7 @@
           <a:p>
             <a:fld id="{F2C6AE98-BAC0-8443-BBA0-C97A4F30D31A}" type="datetime1">
               <a:rPr lang="en-US" smtClean="0"/>
-              <a:t>12/1/2020</a:t>
+              <a:t>12/2/2020</a:t>
             </a:fld>
             <a:endParaRPr lang="en-US"/>
           </a:p>
@@ -4199,7 +4200,7 @@
           <a:p>
             <a:fld id="{88DBBF51-3929-3A49-BA7D-3AF73092A0AD}" type="datetime1">
               <a:rPr lang="en-US" smtClean="0"/>
-              <a:t>12/1/2020</a:t>
+              <a:t>12/2/2020</a:t>
             </a:fld>
             <a:endParaRPr lang="en-US"/>
           </a:p>
@@ -4397,7 +4398,7 @@
           <a:p>
             <a:fld id="{36C5C674-12AF-41F5-BDE5-1132B29F8CB8}" type="datetime1">
               <a:rPr lang="en-US" smtClean="0"/>
-              <a:t>12/1/2020</a:t>
+              <a:t>12/2/2020</a:t>
             </a:fld>
             <a:endParaRPr lang="en-US"/>
           </a:p>
@@ -6770,7 +6771,7 @@
           <a:p>
             <a:fld id="{3D457031-A04F-0040-B79E-439CA9E02781}" type="datetime1">
               <a:rPr lang="en-US" smtClean="0"/>
-              <a:t>12/1/2020</a:t>
+              <a:t>12/2/2020</a:t>
             </a:fld>
             <a:endParaRPr lang="en-US"/>
           </a:p>
@@ -7020,7 +7021,7 @@
           <a:p>
             <a:fld id="{641269E8-56DE-E044-B0E5-B498755A2633}" type="datetime1">
               <a:rPr lang="en-US" smtClean="0"/>
-              <a:t>12/1/2020</a:t>
+              <a:t>12/2/2020</a:t>
             </a:fld>
             <a:endParaRPr lang="en-US"/>
           </a:p>
@@ -7406,7 +7407,7 @@
           <a:p>
             <a:fld id="{219B2A40-E9E6-7E49-9EE5-F8C2FAB652F4}" type="datetime1">
               <a:rPr lang="en-US" smtClean="0"/>
-              <a:t>12/1/2020</a:t>
+              <a:t>12/2/2020</a:t>
             </a:fld>
             <a:endParaRPr lang="en-US"/>
           </a:p>
@@ -7666,7 +7667,7 @@
           <a:p>
             <a:fld id="{08D12B45-3253-4A45-B8F9-2E00FEB0C480}" type="datetime1">
               <a:rPr lang="en-US" smtClean="0"/>
-              <a:t>12/1/2020</a:t>
+              <a:t>12/2/2020</a:t>
             </a:fld>
             <a:endParaRPr lang="en-US"/>
           </a:p>
@@ -9775,8 +9776,8 @@
           <a:chExt cx="0" cy="0"/>
         </a:xfrm>
       </p:grpSpPr>
-      <mc:AlternateContent xmlns:mc="http://schemas.openxmlformats.org/markup-compatibility/2006">
-        <mc:Choice xmlns:a14="http://schemas.microsoft.com/office/drawing/2010/main" Requires="a14">
+      <mc:AlternateContent xmlns:mc="http://schemas.openxmlformats.org/markup-compatibility/2006" xmlns:a14="http://schemas.microsoft.com/office/drawing/2010/main">
+        <mc:Choice Requires="a14">
           <p:sp>
             <p:nvSpPr>
               <p:cNvPr id="2" name="Text Placeholder 1">
@@ -10057,7 +10058,7 @@
             </p:txBody>
           </p:sp>
         </mc:Choice>
-        <mc:Fallback>
+        <mc:Fallback xmlns="">
           <p:sp>
             <p:nvSpPr>
               <p:cNvPr id="2" name="Text Placeholder 1">
@@ -10455,6 +10456,1578 @@
     <p:extLst>
       <p:ext uri="{BB962C8B-B14F-4D97-AF65-F5344CB8AC3E}">
         <p14:creationId xmlns:p14="http://schemas.microsoft.com/office/powerpoint/2010/main" val="547593068"/>
+      </p:ext>
+    </p:extLst>
+  </p:cSld>
+  <p:clrMapOvr>
+    <a:masterClrMapping/>
+  </p:clrMapOvr>
+</p:sld>
+</file>
+
+<file path=ppt/slides/slide13.xml><?xml version="1.0" encoding="utf-8"?>
+<p:sld xmlns:a="http://schemas.openxmlformats.org/drawingml/2006/main" xmlns:r="http://schemas.openxmlformats.org/officeDocument/2006/relationships" xmlns:p="http://schemas.openxmlformats.org/presentationml/2006/main">
+  <p:cSld>
+    <p:spTree>
+      <p:nvGrpSpPr>
+        <p:cNvPr id="1" name=""/>
+        <p:cNvGrpSpPr/>
+        <p:nvPr/>
+      </p:nvGrpSpPr>
+      <p:grpSpPr>
+        <a:xfrm>
+          <a:off x="0" y="0"/>
+          <a:ext cx="0" cy="0"/>
+          <a:chOff x="0" y="0"/>
+          <a:chExt cx="0" cy="0"/>
+        </a:xfrm>
+      </p:grpSpPr>
+      <p:sp>
+        <p:nvSpPr>
+          <p:cNvPr id="6" name="Rectangle 5">
+            <a:extLst>
+              <a:ext uri="{FF2B5EF4-FFF2-40B4-BE49-F238E27FC236}">
+                <a16:creationId xmlns:a16="http://schemas.microsoft.com/office/drawing/2014/main" id="{9824942B-9C73-4123-B3C8-BDF820A4E43B}"/>
+              </a:ext>
+            </a:extLst>
+          </p:cNvPr>
+          <p:cNvSpPr/>
+          <p:nvPr/>
+        </p:nvSpPr>
+        <p:spPr bwMode="gray">
+          <a:xfrm>
+            <a:off x="976618" y="2189691"/>
+            <a:ext cx="874021" cy="221000"/>
+          </a:xfrm>
+          <a:prstGeom prst="rect">
+            <a:avLst/>
+          </a:prstGeom>
+          <a:solidFill>
+            <a:schemeClr val="bg1"/>
+          </a:solidFill>
+          <a:ln>
+            <a:noFill/>
+          </a:ln>
+        </p:spPr>
+        <p:style>
+          <a:lnRef idx="2">
+            <a:schemeClr val="accent1">
+              <a:shade val="50000"/>
+            </a:schemeClr>
+          </a:lnRef>
+          <a:fillRef idx="1">
+            <a:schemeClr val="accent1"/>
+          </a:fillRef>
+          <a:effectRef idx="0">
+            <a:schemeClr val="accent1"/>
+          </a:effectRef>
+          <a:fontRef idx="minor">
+            <a:schemeClr val="lt1"/>
+          </a:fontRef>
+        </p:style>
+        <p:txBody>
+          <a:bodyPr rot="0" spcFirstLastPara="0" vert="horz" wrap="square" lIns="144000" tIns="96000" rIns="144000" bIns="96000" numCol="1" spcCol="0" rtlCol="0" fromWordArt="0" anchor="ctr" anchorCtr="0" forceAA="0" compatLnSpc="1">
+            <a:prstTxWarp prst="textNoShape">
+              <a:avLst/>
+            </a:prstTxWarp>
+            <a:noAutofit/>
+          </a:bodyPr>
+          <a:lstStyle>
+            <a:lvl1pPr marL="0" indent="0">
+              <a:defRPr sz="1100">
+                <a:solidFill>
+                  <a:schemeClr val="lt1"/>
+                </a:solidFill>
+                <a:latin typeface="+mn-lt"/>
+                <a:ea typeface="+mn-ea"/>
+                <a:cs typeface="+mn-cs"/>
+              </a:defRPr>
+            </a:lvl1pPr>
+            <a:lvl2pPr marL="457200" indent="0">
+              <a:defRPr sz="1100">
+                <a:solidFill>
+                  <a:schemeClr val="lt1"/>
+                </a:solidFill>
+                <a:latin typeface="+mn-lt"/>
+                <a:ea typeface="+mn-ea"/>
+                <a:cs typeface="+mn-cs"/>
+              </a:defRPr>
+            </a:lvl2pPr>
+            <a:lvl3pPr marL="914400" indent="0">
+              <a:defRPr sz="1100">
+                <a:solidFill>
+                  <a:schemeClr val="lt1"/>
+                </a:solidFill>
+                <a:latin typeface="+mn-lt"/>
+                <a:ea typeface="+mn-ea"/>
+                <a:cs typeface="+mn-cs"/>
+              </a:defRPr>
+            </a:lvl3pPr>
+            <a:lvl4pPr marL="1371600" indent="0">
+              <a:defRPr sz="1100">
+                <a:solidFill>
+                  <a:schemeClr val="lt1"/>
+                </a:solidFill>
+                <a:latin typeface="+mn-lt"/>
+                <a:ea typeface="+mn-ea"/>
+                <a:cs typeface="+mn-cs"/>
+              </a:defRPr>
+            </a:lvl4pPr>
+            <a:lvl5pPr marL="1828800" indent="0">
+              <a:defRPr sz="1100">
+                <a:solidFill>
+                  <a:schemeClr val="lt1"/>
+                </a:solidFill>
+                <a:latin typeface="+mn-lt"/>
+                <a:ea typeface="+mn-ea"/>
+                <a:cs typeface="+mn-cs"/>
+              </a:defRPr>
+            </a:lvl5pPr>
+            <a:lvl6pPr marL="2286000" indent="0">
+              <a:defRPr sz="1100">
+                <a:solidFill>
+                  <a:schemeClr val="lt1"/>
+                </a:solidFill>
+                <a:latin typeface="+mn-lt"/>
+                <a:ea typeface="+mn-ea"/>
+                <a:cs typeface="+mn-cs"/>
+              </a:defRPr>
+            </a:lvl6pPr>
+            <a:lvl7pPr marL="2743200" indent="0">
+              <a:defRPr sz="1100">
+                <a:solidFill>
+                  <a:schemeClr val="lt1"/>
+                </a:solidFill>
+                <a:latin typeface="+mn-lt"/>
+                <a:ea typeface="+mn-ea"/>
+                <a:cs typeface="+mn-cs"/>
+              </a:defRPr>
+            </a:lvl7pPr>
+            <a:lvl8pPr marL="3200400" indent="0">
+              <a:defRPr sz="1100">
+                <a:solidFill>
+                  <a:schemeClr val="lt1"/>
+                </a:solidFill>
+                <a:latin typeface="+mn-lt"/>
+                <a:ea typeface="+mn-ea"/>
+                <a:cs typeface="+mn-cs"/>
+              </a:defRPr>
+            </a:lvl8pPr>
+            <a:lvl9pPr marL="3657600" indent="0">
+              <a:defRPr sz="1100">
+                <a:solidFill>
+                  <a:schemeClr val="lt1"/>
+                </a:solidFill>
+                <a:latin typeface="+mn-lt"/>
+                <a:ea typeface="+mn-ea"/>
+                <a:cs typeface="+mn-cs"/>
+              </a:defRPr>
+            </a:lvl9pPr>
+          </a:lstStyle>
+          <a:p>
+            <a:pPr algn="ctr">
+              <a:spcBef>
+                <a:spcPts val="400"/>
+              </a:spcBef>
+              <a:spcAft>
+                <a:spcPts val="400"/>
+              </a:spcAft>
+            </a:pPr>
+            <a:endParaRPr lang="en-US" sz="1600" b="1">
+              <a:solidFill>
+                <a:schemeClr val="bg1"/>
+              </a:solidFill>
+            </a:endParaRPr>
+          </a:p>
+        </p:txBody>
+      </p:sp>
+      <p:sp>
+        <p:nvSpPr>
+          <p:cNvPr id="7" name="Rectangle 6">
+            <a:extLst>
+              <a:ext uri="{FF2B5EF4-FFF2-40B4-BE49-F238E27FC236}">
+                <a16:creationId xmlns:a16="http://schemas.microsoft.com/office/drawing/2014/main" id="{1FA495D6-CBC7-48D8-8A97-6E5CC15E143D}"/>
+              </a:ext>
+            </a:extLst>
+          </p:cNvPr>
+          <p:cNvSpPr/>
+          <p:nvPr/>
+        </p:nvSpPr>
+        <p:spPr>
+          <a:xfrm>
+            <a:off x="8596779" y="2788163"/>
+            <a:ext cx="1800303" cy="634314"/>
+          </a:xfrm>
+          <a:prstGeom prst="rect">
+            <a:avLst/>
+          </a:prstGeom>
+        </p:spPr>
+        <p:style>
+          <a:lnRef idx="2">
+            <a:schemeClr val="dk1"/>
+          </a:lnRef>
+          <a:fillRef idx="1">
+            <a:schemeClr val="lt1"/>
+          </a:fillRef>
+          <a:effectRef idx="0">
+            <a:schemeClr val="dk1"/>
+          </a:effectRef>
+          <a:fontRef idx="minor">
+            <a:schemeClr val="dk1"/>
+          </a:fontRef>
+        </p:style>
+        <p:txBody>
+          <a:bodyPr rtlCol="0" anchor="ctr"/>
+          <a:lstStyle/>
+          <a:p>
+            <a:pPr algn="ctr"/>
+            <a:r>
+              <a:rPr lang="en-US" dirty="0"/>
+              <a:t>Supervisory Component</a:t>
+            </a:r>
+          </a:p>
+        </p:txBody>
+      </p:sp>
+      <p:pic>
+        <p:nvPicPr>
+          <p:cNvPr id="8" name="Picture 7">
+            <a:extLst>
+              <a:ext uri="{FF2B5EF4-FFF2-40B4-BE49-F238E27FC236}">
+                <a16:creationId xmlns:a16="http://schemas.microsoft.com/office/drawing/2014/main" id="{6D056B78-D2C9-4654-85C0-DF69D02F9DC8}"/>
+              </a:ext>
+            </a:extLst>
+          </p:cNvPr>
+          <p:cNvPicPr>
+            <a:picLocks noChangeAspect="1"/>
+          </p:cNvPicPr>
+          <p:nvPr/>
+        </p:nvPicPr>
+        <p:blipFill>
+          <a:blip r:embed="rId2">
+            <a:extLst>
+              <a:ext uri="{28A0092B-C50C-407E-A947-70E740481C1C}">
+                <a14:useLocalDpi xmlns:a14="http://schemas.microsoft.com/office/drawing/2010/main" val="0"/>
+              </a:ext>
+            </a:extLst>
+          </a:blip>
+          <a:stretch>
+            <a:fillRect/>
+          </a:stretch>
+        </p:blipFill>
+        <p:spPr>
+          <a:xfrm>
+            <a:off x="1445020" y="1447267"/>
+            <a:ext cx="6835913" cy="4272672"/>
+          </a:xfrm>
+          <a:prstGeom prst="rect">
+            <a:avLst/>
+          </a:prstGeom>
+        </p:spPr>
+      </p:pic>
+      <p:sp>
+        <p:nvSpPr>
+          <p:cNvPr id="11" name="Rectangle 10">
+            <a:extLst>
+              <a:ext uri="{FF2B5EF4-FFF2-40B4-BE49-F238E27FC236}">
+                <a16:creationId xmlns:a16="http://schemas.microsoft.com/office/drawing/2014/main" id="{565E1CD9-D8B3-4E57-88C1-993D14932480}"/>
+              </a:ext>
+            </a:extLst>
+          </p:cNvPr>
+          <p:cNvSpPr/>
+          <p:nvPr/>
+        </p:nvSpPr>
+        <p:spPr>
+          <a:xfrm>
+            <a:off x="8060806" y="1578886"/>
+            <a:ext cx="69272" cy="159327"/>
+          </a:xfrm>
+          <a:prstGeom prst="rect">
+            <a:avLst/>
+          </a:prstGeom>
+          <a:solidFill>
+            <a:schemeClr val="tx1">
+              <a:lumMod val="50000"/>
+              <a:lumOff val="50000"/>
+            </a:schemeClr>
+          </a:solidFill>
+        </p:spPr>
+        <p:style>
+          <a:lnRef idx="2">
+            <a:schemeClr val="dk1"/>
+          </a:lnRef>
+          <a:fillRef idx="1">
+            <a:schemeClr val="lt1"/>
+          </a:fillRef>
+          <a:effectRef idx="0">
+            <a:schemeClr val="dk1"/>
+          </a:effectRef>
+          <a:fontRef idx="minor">
+            <a:schemeClr val="dk1"/>
+          </a:fontRef>
+        </p:style>
+        <p:txBody>
+          <a:bodyPr rtlCol="0" anchor="ctr"/>
+          <a:lstStyle/>
+          <a:p>
+            <a:pPr algn="ctr"/>
+            <a:endParaRPr lang="en-US"/>
+          </a:p>
+        </p:txBody>
+      </p:sp>
+      <p:cxnSp>
+        <p:nvCxnSpPr>
+          <p:cNvPr id="13" name="Connector: Elbow 12">
+            <a:extLst>
+              <a:ext uri="{FF2B5EF4-FFF2-40B4-BE49-F238E27FC236}">
+                <a16:creationId xmlns:a16="http://schemas.microsoft.com/office/drawing/2014/main" id="{26FB5B1E-BC74-48EE-9E0E-0B6D090A7A22}"/>
+              </a:ext>
+            </a:extLst>
+          </p:cNvPr>
+          <p:cNvCxnSpPr>
+            <a:cxnSpLocks/>
+            <a:stCxn id="11" idx="3"/>
+            <a:endCxn id="47" idx="3"/>
+          </p:cNvCxnSpPr>
+          <p:nvPr/>
+        </p:nvCxnSpPr>
+        <p:spPr>
+          <a:xfrm>
+            <a:off x="8130078" y="1658550"/>
+            <a:ext cx="1010806" cy="1060124"/>
+          </a:xfrm>
+          <a:prstGeom prst="bentConnector2">
+            <a:avLst/>
+          </a:prstGeom>
+          <a:ln w="9525" cap="flat" cmpd="sng" algn="ctr">
+            <a:solidFill>
+              <a:srgbClr val="C00000"/>
+            </a:solidFill>
+            <a:prstDash val="solid"/>
+            <a:round/>
+            <a:headEnd type="none" w="med" len="med"/>
+            <a:tailEnd type="arrow" w="med" len="med"/>
+          </a:ln>
+        </p:spPr>
+        <p:style>
+          <a:lnRef idx="0">
+            <a:scrgbClr r="0" g="0" b="0"/>
+          </a:lnRef>
+          <a:fillRef idx="0">
+            <a:scrgbClr r="0" g="0" b="0"/>
+          </a:fillRef>
+          <a:effectRef idx="0">
+            <a:scrgbClr r="0" g="0" b="0"/>
+          </a:effectRef>
+          <a:fontRef idx="minor">
+            <a:schemeClr val="tx1"/>
+          </a:fontRef>
+        </p:style>
+      </p:cxnSp>
+      <p:cxnSp>
+        <p:nvCxnSpPr>
+          <p:cNvPr id="14" name="Connector: Elbow 13">
+            <a:extLst>
+              <a:ext uri="{FF2B5EF4-FFF2-40B4-BE49-F238E27FC236}">
+                <a16:creationId xmlns:a16="http://schemas.microsoft.com/office/drawing/2014/main" id="{8B8A5377-3A6C-49DD-9ED3-75B2F76928CE}"/>
+              </a:ext>
+            </a:extLst>
+          </p:cNvPr>
+          <p:cNvCxnSpPr>
+            <a:cxnSpLocks/>
+            <a:stCxn id="44" idx="1"/>
+            <a:endCxn id="73" idx="3"/>
+          </p:cNvCxnSpPr>
+          <p:nvPr/>
+        </p:nvCxnSpPr>
+        <p:spPr>
+          <a:xfrm rot="5400000">
+            <a:off x="8200592" y="3645293"/>
+            <a:ext cx="796963" cy="497736"/>
+          </a:xfrm>
+          <a:prstGeom prst="bentConnector2">
+            <a:avLst/>
+          </a:prstGeom>
+          <a:ln w="9525" cap="flat" cmpd="sng" algn="ctr">
+            <a:solidFill>
+              <a:srgbClr val="C00000"/>
+            </a:solidFill>
+            <a:prstDash val="solid"/>
+            <a:round/>
+            <a:headEnd type="none" w="med" len="med"/>
+            <a:tailEnd type="arrow" w="med" len="med"/>
+          </a:ln>
+        </p:spPr>
+        <p:style>
+          <a:lnRef idx="0">
+            <a:scrgbClr r="0" g="0" b="0"/>
+          </a:lnRef>
+          <a:fillRef idx="0">
+            <a:scrgbClr r="0" g="0" b="0"/>
+          </a:fillRef>
+          <a:effectRef idx="0">
+            <a:scrgbClr r="0" g="0" b="0"/>
+          </a:effectRef>
+          <a:fontRef idx="minor">
+            <a:schemeClr val="tx1"/>
+          </a:fontRef>
+        </p:style>
+      </p:cxnSp>
+      <p:sp>
+        <p:nvSpPr>
+          <p:cNvPr id="15" name="Rectangle 14">
+            <a:extLst>
+              <a:ext uri="{FF2B5EF4-FFF2-40B4-BE49-F238E27FC236}">
+                <a16:creationId xmlns:a16="http://schemas.microsoft.com/office/drawing/2014/main" id="{3F868C57-4EAD-480F-958C-CB83C7043D32}"/>
+              </a:ext>
+            </a:extLst>
+          </p:cNvPr>
+          <p:cNvSpPr/>
+          <p:nvPr/>
+        </p:nvSpPr>
+        <p:spPr>
+          <a:xfrm rot="16200000">
+            <a:off x="6687472" y="3929893"/>
+            <a:ext cx="69272" cy="159327"/>
+          </a:xfrm>
+          <a:prstGeom prst="rect">
+            <a:avLst/>
+          </a:prstGeom>
+          <a:solidFill>
+            <a:schemeClr val="accent2">
+              <a:lumMod val="60000"/>
+              <a:lumOff val="40000"/>
+            </a:schemeClr>
+          </a:solidFill>
+        </p:spPr>
+        <p:style>
+          <a:lnRef idx="2">
+            <a:schemeClr val="dk1"/>
+          </a:lnRef>
+          <a:fillRef idx="1">
+            <a:schemeClr val="lt1"/>
+          </a:fillRef>
+          <a:effectRef idx="0">
+            <a:schemeClr val="dk1"/>
+          </a:effectRef>
+          <a:fontRef idx="minor">
+            <a:schemeClr val="dk1"/>
+          </a:fontRef>
+        </p:style>
+        <p:txBody>
+          <a:bodyPr rtlCol="0" anchor="ctr"/>
+          <a:lstStyle/>
+          <a:p>
+            <a:pPr algn="ctr"/>
+            <a:endParaRPr lang="en-US"/>
+          </a:p>
+        </p:txBody>
+      </p:sp>
+      <p:cxnSp>
+        <p:nvCxnSpPr>
+          <p:cNvPr id="18" name="Connector: Elbow 17">
+            <a:extLst>
+              <a:ext uri="{FF2B5EF4-FFF2-40B4-BE49-F238E27FC236}">
+                <a16:creationId xmlns:a16="http://schemas.microsoft.com/office/drawing/2014/main" id="{2E8BF0A3-52E1-419D-A42E-750B853F577F}"/>
+              </a:ext>
+            </a:extLst>
+          </p:cNvPr>
+          <p:cNvCxnSpPr>
+            <a:cxnSpLocks/>
+            <a:stCxn id="102" idx="1"/>
+            <a:endCxn id="28" idx="3"/>
+          </p:cNvCxnSpPr>
+          <p:nvPr/>
+        </p:nvCxnSpPr>
+        <p:spPr>
+          <a:xfrm flipH="1" flipV="1">
+            <a:off x="10080498" y="2722122"/>
+            <a:ext cx="391053" cy="362571"/>
+          </a:xfrm>
+          <a:prstGeom prst="bentConnector4">
+            <a:avLst>
+              <a:gd name="adj1" fmla="val -58458"/>
+              <a:gd name="adj2" fmla="val 175469"/>
+            </a:avLst>
+          </a:prstGeom>
+          <a:ln w="9525" cap="flat" cmpd="sng" algn="ctr">
+            <a:solidFill>
+              <a:srgbClr val="C00000"/>
+            </a:solidFill>
+            <a:prstDash val="solid"/>
+            <a:round/>
+            <a:headEnd type="none" w="med" len="med"/>
+            <a:tailEnd type="arrow" w="med" len="med"/>
+          </a:ln>
+        </p:spPr>
+        <p:style>
+          <a:lnRef idx="0">
+            <a:scrgbClr r="0" g="0" b="0"/>
+          </a:lnRef>
+          <a:fillRef idx="0">
+            <a:scrgbClr r="0" g="0" b="0"/>
+          </a:fillRef>
+          <a:effectRef idx="0">
+            <a:scrgbClr r="0" g="0" b="0"/>
+          </a:effectRef>
+          <a:fontRef idx="minor">
+            <a:schemeClr val="tx1"/>
+          </a:fontRef>
+        </p:style>
+      </p:cxnSp>
+      <p:sp>
+        <p:nvSpPr>
+          <p:cNvPr id="28" name="Rectangle 27">
+            <a:extLst>
+              <a:ext uri="{FF2B5EF4-FFF2-40B4-BE49-F238E27FC236}">
+                <a16:creationId xmlns:a16="http://schemas.microsoft.com/office/drawing/2014/main" id="{3E4511F8-2DE0-44B8-AE8F-8498AB8D5B6B}"/>
+              </a:ext>
+            </a:extLst>
+          </p:cNvPr>
+          <p:cNvSpPr/>
+          <p:nvPr/>
+        </p:nvSpPr>
+        <p:spPr>
+          <a:xfrm rot="16200000">
+            <a:off x="10045861" y="2677094"/>
+            <a:ext cx="69272" cy="159327"/>
+          </a:xfrm>
+          <a:prstGeom prst="rect">
+            <a:avLst/>
+          </a:prstGeom>
+          <a:solidFill>
+            <a:schemeClr val="accent2">
+              <a:lumMod val="60000"/>
+              <a:lumOff val="40000"/>
+            </a:schemeClr>
+          </a:solidFill>
+        </p:spPr>
+        <p:style>
+          <a:lnRef idx="2">
+            <a:schemeClr val="dk1"/>
+          </a:lnRef>
+          <a:fillRef idx="1">
+            <a:schemeClr val="lt1"/>
+          </a:fillRef>
+          <a:effectRef idx="0">
+            <a:schemeClr val="dk1"/>
+          </a:effectRef>
+          <a:fontRef idx="minor">
+            <a:schemeClr val="dk1"/>
+          </a:fontRef>
+        </p:style>
+        <p:txBody>
+          <a:bodyPr rtlCol="0" anchor="ctr"/>
+          <a:lstStyle/>
+          <a:p>
+            <a:pPr algn="ctr"/>
+            <a:endParaRPr lang="en-US"/>
+          </a:p>
+        </p:txBody>
+      </p:sp>
+      <p:sp>
+        <p:nvSpPr>
+          <p:cNvPr id="31" name="Rectangle 30">
+            <a:extLst>
+              <a:ext uri="{FF2B5EF4-FFF2-40B4-BE49-F238E27FC236}">
+                <a16:creationId xmlns:a16="http://schemas.microsoft.com/office/drawing/2014/main" id="{DD45F4C7-8391-4E8B-90BD-199C0F30EE84}"/>
+              </a:ext>
+            </a:extLst>
+          </p:cNvPr>
+          <p:cNvSpPr/>
+          <p:nvPr/>
+        </p:nvSpPr>
+        <p:spPr>
+          <a:xfrm>
+            <a:off x="7027097" y="5422067"/>
+            <a:ext cx="69272" cy="159327"/>
+          </a:xfrm>
+          <a:prstGeom prst="rect">
+            <a:avLst/>
+          </a:prstGeom>
+          <a:solidFill>
+            <a:schemeClr val="tx1">
+              <a:lumMod val="50000"/>
+              <a:lumOff val="50000"/>
+            </a:schemeClr>
+          </a:solidFill>
+        </p:spPr>
+        <p:style>
+          <a:lnRef idx="2">
+            <a:schemeClr val="dk1"/>
+          </a:lnRef>
+          <a:fillRef idx="1">
+            <a:schemeClr val="lt1"/>
+          </a:fillRef>
+          <a:effectRef idx="0">
+            <a:schemeClr val="dk1"/>
+          </a:effectRef>
+          <a:fontRef idx="minor">
+            <a:schemeClr val="dk1"/>
+          </a:fontRef>
+        </p:style>
+        <p:txBody>
+          <a:bodyPr rtlCol="0" anchor="ctr"/>
+          <a:lstStyle/>
+          <a:p>
+            <a:pPr algn="ctr"/>
+            <a:endParaRPr lang="en-US"/>
+          </a:p>
+        </p:txBody>
+      </p:sp>
+      <p:cxnSp>
+        <p:nvCxnSpPr>
+          <p:cNvPr id="32" name="Connector: Elbow 31">
+            <a:extLst>
+              <a:ext uri="{FF2B5EF4-FFF2-40B4-BE49-F238E27FC236}">
+                <a16:creationId xmlns:a16="http://schemas.microsoft.com/office/drawing/2014/main" id="{A36B3731-F654-4C68-B4DF-6515BF1B89ED}"/>
+              </a:ext>
+            </a:extLst>
+          </p:cNvPr>
+          <p:cNvCxnSpPr>
+            <a:cxnSpLocks/>
+            <a:stCxn id="31" idx="3"/>
+            <a:endCxn id="50" idx="1"/>
+          </p:cNvCxnSpPr>
+          <p:nvPr/>
+        </p:nvCxnSpPr>
+        <p:spPr>
+          <a:xfrm flipV="1">
+            <a:off x="7096369" y="3495679"/>
+            <a:ext cx="2067418" cy="2006052"/>
+          </a:xfrm>
+          <a:prstGeom prst="bentConnector2">
+            <a:avLst/>
+          </a:prstGeom>
+          <a:ln w="9525" cap="flat" cmpd="sng" algn="ctr">
+            <a:solidFill>
+              <a:srgbClr val="C00000"/>
+            </a:solidFill>
+            <a:prstDash val="solid"/>
+            <a:round/>
+            <a:headEnd type="none" w="med" len="med"/>
+            <a:tailEnd type="arrow" w="med" len="med"/>
+          </a:ln>
+        </p:spPr>
+        <p:style>
+          <a:lnRef idx="0">
+            <a:scrgbClr r="0" g="0" b="0"/>
+          </a:lnRef>
+          <a:fillRef idx="0">
+            <a:scrgbClr r="0" g="0" b="0"/>
+          </a:fillRef>
+          <a:effectRef idx="0">
+            <a:scrgbClr r="0" g="0" b="0"/>
+          </a:effectRef>
+          <a:fontRef idx="minor">
+            <a:schemeClr val="tx1"/>
+          </a:fontRef>
+        </p:style>
+      </p:cxnSp>
+      <p:cxnSp>
+        <p:nvCxnSpPr>
+          <p:cNvPr id="34" name="Connector: Elbow 33">
+            <a:extLst>
+              <a:ext uri="{FF2B5EF4-FFF2-40B4-BE49-F238E27FC236}">
+                <a16:creationId xmlns:a16="http://schemas.microsoft.com/office/drawing/2014/main" id="{9A8C94EC-4550-40C2-9D6F-1473003A2B01}"/>
+              </a:ext>
+            </a:extLst>
+          </p:cNvPr>
+          <p:cNvCxnSpPr>
+            <a:cxnSpLocks/>
+            <a:stCxn id="7" idx="1"/>
+            <a:endCxn id="35" idx="3"/>
+          </p:cNvCxnSpPr>
+          <p:nvPr/>
+        </p:nvCxnSpPr>
+        <p:spPr>
+          <a:xfrm rot="10800000" flipV="1">
+            <a:off x="5406115" y="3105319"/>
+            <a:ext cx="3190664" cy="650929"/>
+          </a:xfrm>
+          <a:prstGeom prst="bentConnector3">
+            <a:avLst>
+              <a:gd name="adj1" fmla="val 89514"/>
+            </a:avLst>
+          </a:prstGeom>
+          <a:ln w="9525" cap="flat" cmpd="sng" algn="ctr">
+            <a:solidFill>
+              <a:srgbClr val="C00000"/>
+            </a:solidFill>
+            <a:prstDash val="solid"/>
+            <a:round/>
+            <a:headEnd type="none" w="med" len="med"/>
+            <a:tailEnd type="arrow" w="med" len="med"/>
+          </a:ln>
+        </p:spPr>
+        <p:style>
+          <a:lnRef idx="0">
+            <a:scrgbClr r="0" g="0" b="0"/>
+          </a:lnRef>
+          <a:fillRef idx="0">
+            <a:scrgbClr r="0" g="0" b="0"/>
+          </a:fillRef>
+          <a:effectRef idx="0">
+            <a:scrgbClr r="0" g="0" b="0"/>
+          </a:effectRef>
+          <a:fontRef idx="minor">
+            <a:schemeClr val="tx1"/>
+          </a:fontRef>
+        </p:style>
+      </p:cxnSp>
+      <p:sp>
+        <p:nvSpPr>
+          <p:cNvPr id="35" name="Rectangle 34">
+            <a:extLst>
+              <a:ext uri="{FF2B5EF4-FFF2-40B4-BE49-F238E27FC236}">
+                <a16:creationId xmlns:a16="http://schemas.microsoft.com/office/drawing/2014/main" id="{CF0F2C8D-5EB9-44A5-BB2A-A4CD01E92530}"/>
+              </a:ext>
+            </a:extLst>
+          </p:cNvPr>
+          <p:cNvSpPr/>
+          <p:nvPr/>
+        </p:nvSpPr>
+        <p:spPr>
+          <a:xfrm>
+            <a:off x="5336843" y="3676585"/>
+            <a:ext cx="69272" cy="159327"/>
+          </a:xfrm>
+          <a:prstGeom prst="rect">
+            <a:avLst/>
+          </a:prstGeom>
+          <a:solidFill>
+            <a:schemeClr val="accent2">
+              <a:lumMod val="60000"/>
+              <a:lumOff val="40000"/>
+            </a:schemeClr>
+          </a:solidFill>
+        </p:spPr>
+        <p:style>
+          <a:lnRef idx="2">
+            <a:schemeClr val="dk1"/>
+          </a:lnRef>
+          <a:fillRef idx="1">
+            <a:schemeClr val="lt1"/>
+          </a:fillRef>
+          <a:effectRef idx="0">
+            <a:schemeClr val="dk1"/>
+          </a:effectRef>
+          <a:fontRef idx="minor">
+            <a:schemeClr val="dk1"/>
+          </a:fontRef>
+        </p:style>
+        <p:txBody>
+          <a:bodyPr rtlCol="0" anchor="ctr"/>
+          <a:lstStyle/>
+          <a:p>
+            <a:pPr algn="ctr"/>
+            <a:endParaRPr lang="en-US"/>
+          </a:p>
+        </p:txBody>
+      </p:sp>
+      <p:sp>
+        <p:nvSpPr>
+          <p:cNvPr id="42" name="Rectangle 41">
+            <a:extLst>
+              <a:ext uri="{FF2B5EF4-FFF2-40B4-BE49-F238E27FC236}">
+                <a16:creationId xmlns:a16="http://schemas.microsoft.com/office/drawing/2014/main" id="{9E1AD673-E345-470B-B090-CBA44B6B9BD3}"/>
+              </a:ext>
+            </a:extLst>
+          </p:cNvPr>
+          <p:cNvSpPr/>
+          <p:nvPr/>
+        </p:nvSpPr>
+        <p:spPr>
+          <a:xfrm rot="5400000">
+            <a:off x="3297323" y="4495270"/>
+            <a:ext cx="69272" cy="159327"/>
+          </a:xfrm>
+          <a:prstGeom prst="rect">
+            <a:avLst/>
+          </a:prstGeom>
+          <a:solidFill>
+            <a:schemeClr val="accent2">
+              <a:lumMod val="60000"/>
+              <a:lumOff val="40000"/>
+            </a:schemeClr>
+          </a:solidFill>
+        </p:spPr>
+        <p:style>
+          <a:lnRef idx="2">
+            <a:schemeClr val="dk1"/>
+          </a:lnRef>
+          <a:fillRef idx="1">
+            <a:schemeClr val="lt1"/>
+          </a:fillRef>
+          <a:effectRef idx="0">
+            <a:schemeClr val="dk1"/>
+          </a:effectRef>
+          <a:fontRef idx="minor">
+            <a:schemeClr val="dk1"/>
+          </a:fontRef>
+        </p:style>
+        <p:txBody>
+          <a:bodyPr rtlCol="0" anchor="ctr"/>
+          <a:lstStyle/>
+          <a:p>
+            <a:pPr algn="ctr"/>
+            <a:endParaRPr lang="en-US"/>
+          </a:p>
+        </p:txBody>
+      </p:sp>
+      <p:sp>
+        <p:nvSpPr>
+          <p:cNvPr id="44" name="Rectangle 43">
+            <a:extLst>
+              <a:ext uri="{FF2B5EF4-FFF2-40B4-BE49-F238E27FC236}">
+                <a16:creationId xmlns:a16="http://schemas.microsoft.com/office/drawing/2014/main" id="{183F5B3F-A12A-46DC-83E5-E68A58C587E3}"/>
+              </a:ext>
+            </a:extLst>
+          </p:cNvPr>
+          <p:cNvSpPr/>
+          <p:nvPr/>
+        </p:nvSpPr>
+        <p:spPr>
+          <a:xfrm rot="16200000">
+            <a:off x="8813304" y="3381380"/>
+            <a:ext cx="69272" cy="159327"/>
+          </a:xfrm>
+          <a:prstGeom prst="rect">
+            <a:avLst/>
+          </a:prstGeom>
+          <a:solidFill>
+            <a:schemeClr val="tx1">
+              <a:lumMod val="50000"/>
+              <a:lumOff val="50000"/>
+            </a:schemeClr>
+          </a:solidFill>
+        </p:spPr>
+        <p:style>
+          <a:lnRef idx="2">
+            <a:schemeClr val="dk1"/>
+          </a:lnRef>
+          <a:fillRef idx="1">
+            <a:schemeClr val="lt1"/>
+          </a:fillRef>
+          <a:effectRef idx="0">
+            <a:schemeClr val="dk1"/>
+          </a:effectRef>
+          <a:fontRef idx="minor">
+            <a:schemeClr val="dk1"/>
+          </a:fontRef>
+        </p:style>
+        <p:txBody>
+          <a:bodyPr rtlCol="0" anchor="ctr"/>
+          <a:lstStyle/>
+          <a:p>
+            <a:pPr algn="ctr"/>
+            <a:endParaRPr lang="en-US"/>
+          </a:p>
+        </p:txBody>
+      </p:sp>
+      <p:sp>
+        <p:nvSpPr>
+          <p:cNvPr id="47" name="Rectangle 46">
+            <a:extLst>
+              <a:ext uri="{FF2B5EF4-FFF2-40B4-BE49-F238E27FC236}">
+                <a16:creationId xmlns:a16="http://schemas.microsoft.com/office/drawing/2014/main" id="{F852E897-AFB2-46EA-BBFD-0EB24F51D921}"/>
+              </a:ext>
+            </a:extLst>
+          </p:cNvPr>
+          <p:cNvSpPr/>
+          <p:nvPr/>
+        </p:nvSpPr>
+        <p:spPr>
+          <a:xfrm rot="16200000">
+            <a:off x="9106247" y="2673646"/>
+            <a:ext cx="69272" cy="159327"/>
+          </a:xfrm>
+          <a:prstGeom prst="rect">
+            <a:avLst/>
+          </a:prstGeom>
+          <a:solidFill>
+            <a:schemeClr val="accent2">
+              <a:lumMod val="60000"/>
+              <a:lumOff val="40000"/>
+            </a:schemeClr>
+          </a:solidFill>
+        </p:spPr>
+        <p:style>
+          <a:lnRef idx="2">
+            <a:schemeClr val="dk1"/>
+          </a:lnRef>
+          <a:fillRef idx="1">
+            <a:schemeClr val="lt1"/>
+          </a:fillRef>
+          <a:effectRef idx="0">
+            <a:schemeClr val="dk1"/>
+          </a:effectRef>
+          <a:fontRef idx="minor">
+            <a:schemeClr val="dk1"/>
+          </a:fontRef>
+        </p:style>
+        <p:txBody>
+          <a:bodyPr rtlCol="0" anchor="ctr"/>
+          <a:lstStyle/>
+          <a:p>
+            <a:pPr algn="ctr"/>
+            <a:endParaRPr lang="en-US"/>
+          </a:p>
+        </p:txBody>
+      </p:sp>
+      <p:sp>
+        <p:nvSpPr>
+          <p:cNvPr id="50" name="Rectangle 49">
+            <a:extLst>
+              <a:ext uri="{FF2B5EF4-FFF2-40B4-BE49-F238E27FC236}">
+                <a16:creationId xmlns:a16="http://schemas.microsoft.com/office/drawing/2014/main" id="{7D9480B3-6D30-4694-9B86-CB12EF93BF7F}"/>
+              </a:ext>
+            </a:extLst>
+          </p:cNvPr>
+          <p:cNvSpPr/>
+          <p:nvPr/>
+        </p:nvSpPr>
+        <p:spPr>
+          <a:xfrm rot="16200000">
+            <a:off x="9129150" y="3381379"/>
+            <a:ext cx="69272" cy="159327"/>
+          </a:xfrm>
+          <a:prstGeom prst="rect">
+            <a:avLst/>
+          </a:prstGeom>
+          <a:solidFill>
+            <a:schemeClr val="accent2">
+              <a:lumMod val="60000"/>
+              <a:lumOff val="40000"/>
+            </a:schemeClr>
+          </a:solidFill>
+        </p:spPr>
+        <p:style>
+          <a:lnRef idx="2">
+            <a:schemeClr val="dk1"/>
+          </a:lnRef>
+          <a:fillRef idx="1">
+            <a:schemeClr val="lt1"/>
+          </a:fillRef>
+          <a:effectRef idx="0">
+            <a:schemeClr val="dk1"/>
+          </a:effectRef>
+          <a:fontRef idx="minor">
+            <a:schemeClr val="dk1"/>
+          </a:fontRef>
+        </p:style>
+        <p:txBody>
+          <a:bodyPr rtlCol="0" anchor="ctr"/>
+          <a:lstStyle/>
+          <a:p>
+            <a:pPr algn="ctr"/>
+            <a:endParaRPr lang="en-US"/>
+          </a:p>
+        </p:txBody>
+      </p:sp>
+      <p:sp>
+        <p:nvSpPr>
+          <p:cNvPr id="54" name="Rectangle 53">
+            <a:extLst>
+              <a:ext uri="{FF2B5EF4-FFF2-40B4-BE49-F238E27FC236}">
+                <a16:creationId xmlns:a16="http://schemas.microsoft.com/office/drawing/2014/main" id="{DDA12747-ADA4-4E9B-8118-72AAAFB435B2}"/>
+              </a:ext>
+            </a:extLst>
+          </p:cNvPr>
+          <p:cNvSpPr/>
+          <p:nvPr/>
+        </p:nvSpPr>
+        <p:spPr>
+          <a:xfrm rot="16200000">
+            <a:off x="9441067" y="3387840"/>
+            <a:ext cx="69272" cy="159327"/>
+          </a:xfrm>
+          <a:prstGeom prst="rect">
+            <a:avLst/>
+          </a:prstGeom>
+          <a:solidFill>
+            <a:schemeClr val="tx1">
+              <a:lumMod val="50000"/>
+              <a:lumOff val="50000"/>
+            </a:schemeClr>
+          </a:solidFill>
+        </p:spPr>
+        <p:style>
+          <a:lnRef idx="2">
+            <a:schemeClr val="dk1"/>
+          </a:lnRef>
+          <a:fillRef idx="1">
+            <a:schemeClr val="lt1"/>
+          </a:fillRef>
+          <a:effectRef idx="0">
+            <a:schemeClr val="dk1"/>
+          </a:effectRef>
+          <a:fontRef idx="minor">
+            <a:schemeClr val="dk1"/>
+          </a:fontRef>
+        </p:style>
+        <p:txBody>
+          <a:bodyPr rtlCol="0" anchor="ctr"/>
+          <a:lstStyle/>
+          <a:p>
+            <a:pPr algn="ctr"/>
+            <a:endParaRPr lang="en-US"/>
+          </a:p>
+        </p:txBody>
+      </p:sp>
+      <p:sp>
+        <p:nvSpPr>
+          <p:cNvPr id="61" name="Rectangle 60">
+            <a:extLst>
+              <a:ext uri="{FF2B5EF4-FFF2-40B4-BE49-F238E27FC236}">
+                <a16:creationId xmlns:a16="http://schemas.microsoft.com/office/drawing/2014/main" id="{BA9DA601-0612-44A6-89ED-FDA622A206CE}"/>
+              </a:ext>
+            </a:extLst>
+          </p:cNvPr>
+          <p:cNvSpPr/>
+          <p:nvPr/>
+        </p:nvSpPr>
+        <p:spPr>
+          <a:xfrm rot="5400000">
+            <a:off x="2135554" y="3631558"/>
+            <a:ext cx="69272" cy="159327"/>
+          </a:xfrm>
+          <a:prstGeom prst="rect">
+            <a:avLst/>
+          </a:prstGeom>
+          <a:solidFill>
+            <a:schemeClr val="accent2">
+              <a:lumMod val="60000"/>
+              <a:lumOff val="40000"/>
+            </a:schemeClr>
+          </a:solidFill>
+        </p:spPr>
+        <p:style>
+          <a:lnRef idx="2">
+            <a:schemeClr val="dk1"/>
+          </a:lnRef>
+          <a:fillRef idx="1">
+            <a:schemeClr val="lt1"/>
+          </a:fillRef>
+          <a:effectRef idx="0">
+            <a:schemeClr val="dk1"/>
+          </a:effectRef>
+          <a:fontRef idx="minor">
+            <a:schemeClr val="dk1"/>
+          </a:fontRef>
+        </p:style>
+        <p:txBody>
+          <a:bodyPr rtlCol="0" anchor="ctr"/>
+          <a:lstStyle/>
+          <a:p>
+            <a:pPr algn="ctr"/>
+            <a:endParaRPr lang="en-US"/>
+          </a:p>
+        </p:txBody>
+      </p:sp>
+      <p:sp>
+        <p:nvSpPr>
+          <p:cNvPr id="62" name="Rectangle 61">
+            <a:extLst>
+              <a:ext uri="{FF2B5EF4-FFF2-40B4-BE49-F238E27FC236}">
+                <a16:creationId xmlns:a16="http://schemas.microsoft.com/office/drawing/2014/main" id="{2441A780-C888-459E-B163-63494C6AE62C}"/>
+              </a:ext>
+            </a:extLst>
+          </p:cNvPr>
+          <p:cNvSpPr/>
+          <p:nvPr/>
+        </p:nvSpPr>
+        <p:spPr>
+          <a:xfrm rot="16200000">
+            <a:off x="10168618" y="3381378"/>
+            <a:ext cx="69272" cy="159327"/>
+          </a:xfrm>
+          <a:prstGeom prst="rect">
+            <a:avLst/>
+          </a:prstGeom>
+          <a:solidFill>
+            <a:schemeClr val="tx1">
+              <a:lumMod val="50000"/>
+              <a:lumOff val="50000"/>
+            </a:schemeClr>
+          </a:solidFill>
+        </p:spPr>
+        <p:style>
+          <a:lnRef idx="2">
+            <a:schemeClr val="dk1"/>
+          </a:lnRef>
+          <a:fillRef idx="1">
+            <a:schemeClr val="lt1"/>
+          </a:fillRef>
+          <a:effectRef idx="0">
+            <a:schemeClr val="dk1"/>
+          </a:effectRef>
+          <a:fontRef idx="minor">
+            <a:schemeClr val="dk1"/>
+          </a:fontRef>
+        </p:style>
+        <p:txBody>
+          <a:bodyPr rtlCol="0" anchor="ctr"/>
+          <a:lstStyle/>
+          <a:p>
+            <a:pPr algn="ctr"/>
+            <a:endParaRPr lang="en-US"/>
+          </a:p>
+        </p:txBody>
+      </p:sp>
+      <p:sp>
+        <p:nvSpPr>
+          <p:cNvPr id="70" name="Rectangle 69">
+            <a:extLst>
+              <a:ext uri="{FF2B5EF4-FFF2-40B4-BE49-F238E27FC236}">
+                <a16:creationId xmlns:a16="http://schemas.microsoft.com/office/drawing/2014/main" id="{A7FBF5DC-9C7B-458F-B7A0-38F127C68B60}"/>
+              </a:ext>
+            </a:extLst>
+          </p:cNvPr>
+          <p:cNvSpPr/>
+          <p:nvPr/>
+        </p:nvSpPr>
+        <p:spPr>
+          <a:xfrm>
+            <a:off x="8522411" y="3187267"/>
+            <a:ext cx="69272" cy="159327"/>
+          </a:xfrm>
+          <a:prstGeom prst="rect">
+            <a:avLst/>
+          </a:prstGeom>
+          <a:solidFill>
+            <a:schemeClr val="tx1">
+              <a:lumMod val="50000"/>
+              <a:lumOff val="50000"/>
+            </a:schemeClr>
+          </a:solidFill>
+        </p:spPr>
+        <p:style>
+          <a:lnRef idx="2">
+            <a:schemeClr val="dk1"/>
+          </a:lnRef>
+          <a:fillRef idx="1">
+            <a:schemeClr val="lt1"/>
+          </a:fillRef>
+          <a:effectRef idx="0">
+            <a:schemeClr val="dk1"/>
+          </a:effectRef>
+          <a:fontRef idx="minor">
+            <a:schemeClr val="dk1"/>
+          </a:fontRef>
+        </p:style>
+        <p:txBody>
+          <a:bodyPr rtlCol="0" anchor="ctr"/>
+          <a:lstStyle/>
+          <a:p>
+            <a:pPr algn="ctr"/>
+            <a:endParaRPr lang="en-US"/>
+          </a:p>
+        </p:txBody>
+      </p:sp>
+      <p:cxnSp>
+        <p:nvCxnSpPr>
+          <p:cNvPr id="71" name="Connector: Elbow 70">
+            <a:extLst>
+              <a:ext uri="{FF2B5EF4-FFF2-40B4-BE49-F238E27FC236}">
+                <a16:creationId xmlns:a16="http://schemas.microsoft.com/office/drawing/2014/main" id="{DF4A0D5B-A26A-4D68-A3C6-53C0B8466EBA}"/>
+              </a:ext>
+            </a:extLst>
+          </p:cNvPr>
+          <p:cNvCxnSpPr>
+            <a:cxnSpLocks/>
+            <a:stCxn id="70" idx="1"/>
+            <a:endCxn id="15" idx="3"/>
+          </p:cNvCxnSpPr>
+          <p:nvPr/>
+        </p:nvCxnSpPr>
+        <p:spPr>
+          <a:xfrm rot="10800000" flipV="1">
+            <a:off x="6722109" y="3266931"/>
+            <a:ext cx="1800302" cy="707990"/>
+          </a:xfrm>
+          <a:prstGeom prst="bentConnector2">
+            <a:avLst/>
+          </a:prstGeom>
+          <a:ln w="9525" cap="flat" cmpd="sng" algn="ctr">
+            <a:solidFill>
+              <a:srgbClr val="C00000"/>
+            </a:solidFill>
+            <a:prstDash val="solid"/>
+            <a:round/>
+            <a:headEnd type="none" w="med" len="med"/>
+            <a:tailEnd type="arrow" w="med" len="med"/>
+          </a:ln>
+        </p:spPr>
+        <p:style>
+          <a:lnRef idx="0">
+            <a:scrgbClr r="0" g="0" b="0"/>
+          </a:lnRef>
+          <a:fillRef idx="0">
+            <a:scrgbClr r="0" g="0" b="0"/>
+          </a:fillRef>
+          <a:effectRef idx="0">
+            <a:scrgbClr r="0" g="0" b="0"/>
+          </a:effectRef>
+          <a:fontRef idx="minor">
+            <a:schemeClr val="tx1"/>
+          </a:fontRef>
+        </p:style>
+      </p:cxnSp>
+      <p:sp>
+        <p:nvSpPr>
+          <p:cNvPr id="73" name="Rectangle 72">
+            <a:extLst>
+              <a:ext uri="{FF2B5EF4-FFF2-40B4-BE49-F238E27FC236}">
+                <a16:creationId xmlns:a16="http://schemas.microsoft.com/office/drawing/2014/main" id="{1CCDA87F-E655-4DC0-A57B-5C73D797CF3B}"/>
+              </a:ext>
+            </a:extLst>
+          </p:cNvPr>
+          <p:cNvSpPr/>
+          <p:nvPr/>
+        </p:nvSpPr>
+        <p:spPr>
+          <a:xfrm>
+            <a:off x="8280933" y="4212979"/>
+            <a:ext cx="69272" cy="159327"/>
+          </a:xfrm>
+          <a:prstGeom prst="rect">
+            <a:avLst/>
+          </a:prstGeom>
+          <a:solidFill>
+            <a:schemeClr val="accent2">
+              <a:lumMod val="60000"/>
+              <a:lumOff val="40000"/>
+            </a:schemeClr>
+          </a:solidFill>
+        </p:spPr>
+        <p:style>
+          <a:lnRef idx="2">
+            <a:schemeClr val="dk1"/>
+          </a:lnRef>
+          <a:fillRef idx="1">
+            <a:schemeClr val="lt1"/>
+          </a:fillRef>
+          <a:effectRef idx="0">
+            <a:schemeClr val="dk1"/>
+          </a:effectRef>
+          <a:fontRef idx="minor">
+            <a:schemeClr val="dk1"/>
+          </a:fontRef>
+        </p:style>
+        <p:txBody>
+          <a:bodyPr rtlCol="0" anchor="ctr"/>
+          <a:lstStyle/>
+          <a:p>
+            <a:pPr algn="ctr"/>
+            <a:endParaRPr lang="en-US"/>
+          </a:p>
+        </p:txBody>
+      </p:sp>
+      <p:sp>
+        <p:nvSpPr>
+          <p:cNvPr id="80" name="Rectangle 79">
+            <a:extLst>
+              <a:ext uri="{FF2B5EF4-FFF2-40B4-BE49-F238E27FC236}">
+                <a16:creationId xmlns:a16="http://schemas.microsoft.com/office/drawing/2014/main" id="{EF7B6975-647B-41A6-8A7D-B48858D22CAA}"/>
+              </a:ext>
+            </a:extLst>
+          </p:cNvPr>
+          <p:cNvSpPr/>
+          <p:nvPr/>
+        </p:nvSpPr>
+        <p:spPr>
+          <a:xfrm rot="16200000">
+            <a:off x="9780690" y="3388305"/>
+            <a:ext cx="69272" cy="159327"/>
+          </a:xfrm>
+          <a:prstGeom prst="rect">
+            <a:avLst/>
+          </a:prstGeom>
+          <a:solidFill>
+            <a:schemeClr val="tx1">
+              <a:lumMod val="50000"/>
+              <a:lumOff val="50000"/>
+            </a:schemeClr>
+          </a:solidFill>
+        </p:spPr>
+        <p:style>
+          <a:lnRef idx="2">
+            <a:schemeClr val="dk1"/>
+          </a:lnRef>
+          <a:fillRef idx="1">
+            <a:schemeClr val="lt1"/>
+          </a:fillRef>
+          <a:effectRef idx="0">
+            <a:schemeClr val="dk1"/>
+          </a:effectRef>
+          <a:fontRef idx="minor">
+            <a:schemeClr val="dk1"/>
+          </a:fontRef>
+        </p:style>
+        <p:txBody>
+          <a:bodyPr rtlCol="0" anchor="ctr"/>
+          <a:lstStyle/>
+          <a:p>
+            <a:pPr algn="ctr"/>
+            <a:endParaRPr lang="en-US"/>
+          </a:p>
+        </p:txBody>
+      </p:sp>
+      <p:cxnSp>
+        <p:nvCxnSpPr>
+          <p:cNvPr id="81" name="Connector: Elbow 80">
+            <a:extLst>
+              <a:ext uri="{FF2B5EF4-FFF2-40B4-BE49-F238E27FC236}">
+                <a16:creationId xmlns:a16="http://schemas.microsoft.com/office/drawing/2014/main" id="{EFED609C-DC3A-4FA9-8D3B-3C514BF3D8ED}"/>
+              </a:ext>
+            </a:extLst>
+          </p:cNvPr>
+          <p:cNvCxnSpPr>
+            <a:cxnSpLocks/>
+            <a:stCxn id="54" idx="1"/>
+            <a:endCxn id="83" idx="3"/>
+          </p:cNvCxnSpPr>
+          <p:nvPr/>
+        </p:nvCxnSpPr>
+        <p:spPr>
+          <a:xfrm rot="5400000">
+            <a:off x="5760156" y="1784080"/>
+            <a:ext cx="1997489" cy="5433609"/>
+          </a:xfrm>
+          <a:prstGeom prst="bentConnector3">
+            <a:avLst>
+              <a:gd name="adj1" fmla="val 122022"/>
+            </a:avLst>
+          </a:prstGeom>
+          <a:ln w="9525" cap="flat" cmpd="sng" algn="ctr">
+            <a:solidFill>
+              <a:srgbClr val="C00000"/>
+            </a:solidFill>
+            <a:prstDash val="solid"/>
+            <a:round/>
+            <a:headEnd type="none" w="med" len="med"/>
+            <a:tailEnd type="arrow" w="med" len="med"/>
+          </a:ln>
+        </p:spPr>
+        <p:style>
+          <a:lnRef idx="0">
+            <a:scrgbClr r="0" g="0" b="0"/>
+          </a:lnRef>
+          <a:fillRef idx="0">
+            <a:scrgbClr r="0" g="0" b="0"/>
+          </a:fillRef>
+          <a:effectRef idx="0">
+            <a:scrgbClr r="0" g="0" b="0"/>
+          </a:effectRef>
+          <a:fontRef idx="minor">
+            <a:schemeClr val="tx1"/>
+          </a:fontRef>
+        </p:style>
+      </p:cxnSp>
+      <p:sp>
+        <p:nvSpPr>
+          <p:cNvPr id="83" name="Rectangle 82">
+            <a:extLst>
+              <a:ext uri="{FF2B5EF4-FFF2-40B4-BE49-F238E27FC236}">
+                <a16:creationId xmlns:a16="http://schemas.microsoft.com/office/drawing/2014/main" id="{AC266AEA-AC61-4188-A5A5-ED324857E003}"/>
+              </a:ext>
+            </a:extLst>
+          </p:cNvPr>
+          <p:cNvSpPr/>
+          <p:nvPr/>
+        </p:nvSpPr>
+        <p:spPr>
+          <a:xfrm rot="5400000">
+            <a:off x="4007459" y="5385329"/>
+            <a:ext cx="69272" cy="159327"/>
+          </a:xfrm>
+          <a:prstGeom prst="rect">
+            <a:avLst/>
+          </a:prstGeom>
+          <a:solidFill>
+            <a:schemeClr val="accent2">
+              <a:lumMod val="60000"/>
+              <a:lumOff val="40000"/>
+            </a:schemeClr>
+          </a:solidFill>
+        </p:spPr>
+        <p:style>
+          <a:lnRef idx="2">
+            <a:schemeClr val="dk1"/>
+          </a:lnRef>
+          <a:fillRef idx="1">
+            <a:schemeClr val="lt1"/>
+          </a:fillRef>
+          <a:effectRef idx="0">
+            <a:schemeClr val="dk1"/>
+          </a:effectRef>
+          <a:fontRef idx="minor">
+            <a:schemeClr val="dk1"/>
+          </a:fontRef>
+        </p:style>
+        <p:txBody>
+          <a:bodyPr rtlCol="0" anchor="ctr"/>
+          <a:lstStyle/>
+          <a:p>
+            <a:pPr algn="ctr"/>
+            <a:endParaRPr lang="en-US"/>
+          </a:p>
+        </p:txBody>
+      </p:sp>
+      <p:cxnSp>
+        <p:nvCxnSpPr>
+          <p:cNvPr id="92" name="Connector: Elbow 91">
+            <a:extLst>
+              <a:ext uri="{FF2B5EF4-FFF2-40B4-BE49-F238E27FC236}">
+                <a16:creationId xmlns:a16="http://schemas.microsoft.com/office/drawing/2014/main" id="{CA6E98CD-A164-43D6-A581-73947F3AFD71}"/>
+              </a:ext>
+            </a:extLst>
+          </p:cNvPr>
+          <p:cNvCxnSpPr>
+            <a:cxnSpLocks/>
+          </p:cNvCxnSpPr>
+          <p:nvPr/>
+        </p:nvCxnSpPr>
+        <p:spPr>
+          <a:xfrm rot="5400000">
+            <a:off x="6020161" y="814404"/>
+            <a:ext cx="1106965" cy="6483368"/>
+          </a:xfrm>
+          <a:prstGeom prst="bentConnector3">
+            <a:avLst>
+              <a:gd name="adj1" fmla="val 238613"/>
+            </a:avLst>
+          </a:prstGeom>
+          <a:ln w="9525" cap="flat" cmpd="sng" algn="ctr">
+            <a:solidFill>
+              <a:srgbClr val="C00000"/>
+            </a:solidFill>
+            <a:prstDash val="solid"/>
+            <a:round/>
+            <a:headEnd type="none" w="med" len="med"/>
+            <a:tailEnd type="arrow" w="med" len="med"/>
+          </a:ln>
+        </p:spPr>
+        <p:style>
+          <a:lnRef idx="0">
+            <a:scrgbClr r="0" g="0" b="0"/>
+          </a:lnRef>
+          <a:fillRef idx="0">
+            <a:scrgbClr r="0" g="0" b="0"/>
+          </a:fillRef>
+          <a:effectRef idx="0">
+            <a:scrgbClr r="0" g="0" b="0"/>
+          </a:effectRef>
+          <a:fontRef idx="minor">
+            <a:schemeClr val="tx1"/>
+          </a:fontRef>
+        </p:style>
+      </p:cxnSp>
+      <p:cxnSp>
+        <p:nvCxnSpPr>
+          <p:cNvPr id="93" name="Connector: Elbow 92">
+            <a:extLst>
+              <a:ext uri="{FF2B5EF4-FFF2-40B4-BE49-F238E27FC236}">
+                <a16:creationId xmlns:a16="http://schemas.microsoft.com/office/drawing/2014/main" id="{B478803D-977B-4F4F-94F6-750D43BF42B8}"/>
+              </a:ext>
+            </a:extLst>
+          </p:cNvPr>
+          <p:cNvCxnSpPr>
+            <a:cxnSpLocks/>
+            <a:stCxn id="62" idx="1"/>
+            <a:endCxn id="61" idx="3"/>
+          </p:cNvCxnSpPr>
+          <p:nvPr/>
+        </p:nvCxnSpPr>
+        <p:spPr>
+          <a:xfrm rot="5400000">
+            <a:off x="6061633" y="-395764"/>
+            <a:ext cx="250180" cy="8033065"/>
+          </a:xfrm>
+          <a:prstGeom prst="bentConnector3">
+            <a:avLst>
+              <a:gd name="adj1" fmla="val 1112039"/>
+            </a:avLst>
+          </a:prstGeom>
+          <a:ln w="9525" cap="flat" cmpd="sng" algn="ctr">
+            <a:solidFill>
+              <a:srgbClr val="C00000"/>
+            </a:solidFill>
+            <a:prstDash val="solid"/>
+            <a:round/>
+            <a:headEnd type="none" w="med" len="med"/>
+            <a:tailEnd type="arrow" w="med" len="med"/>
+          </a:ln>
+        </p:spPr>
+        <p:style>
+          <a:lnRef idx="0">
+            <a:scrgbClr r="0" g="0" b="0"/>
+          </a:lnRef>
+          <a:fillRef idx="0">
+            <a:scrgbClr r="0" g="0" b="0"/>
+          </a:fillRef>
+          <a:effectRef idx="0">
+            <a:scrgbClr r="0" g="0" b="0"/>
+          </a:effectRef>
+          <a:fontRef idx="minor">
+            <a:schemeClr val="tx1"/>
+          </a:fontRef>
+        </p:style>
+      </p:cxnSp>
+      <p:sp>
+        <p:nvSpPr>
+          <p:cNvPr id="102" name="Rectangle 101">
+            <a:extLst>
+              <a:ext uri="{FF2B5EF4-FFF2-40B4-BE49-F238E27FC236}">
+                <a16:creationId xmlns:a16="http://schemas.microsoft.com/office/drawing/2014/main" id="{DF00B70F-D6F7-44CB-B925-48CA4FC6C473}"/>
+              </a:ext>
+            </a:extLst>
+          </p:cNvPr>
+          <p:cNvSpPr/>
+          <p:nvPr/>
+        </p:nvSpPr>
+        <p:spPr>
+          <a:xfrm rot="10800000">
+            <a:off x="10402279" y="3005030"/>
+            <a:ext cx="69272" cy="159327"/>
+          </a:xfrm>
+          <a:prstGeom prst="rect">
+            <a:avLst/>
+          </a:prstGeom>
+          <a:solidFill>
+            <a:schemeClr val="tx1">
+              <a:lumMod val="50000"/>
+              <a:lumOff val="50000"/>
+            </a:schemeClr>
+          </a:solidFill>
+        </p:spPr>
+        <p:style>
+          <a:lnRef idx="2">
+            <a:schemeClr val="dk1"/>
+          </a:lnRef>
+          <a:fillRef idx="1">
+            <a:schemeClr val="lt1"/>
+          </a:fillRef>
+          <a:effectRef idx="0">
+            <a:schemeClr val="dk1"/>
+          </a:effectRef>
+          <a:fontRef idx="minor">
+            <a:schemeClr val="dk1"/>
+          </a:fontRef>
+        </p:style>
+        <p:txBody>
+          <a:bodyPr rtlCol="0" anchor="ctr"/>
+          <a:lstStyle/>
+          <a:p>
+            <a:pPr algn="ctr"/>
+            <a:endParaRPr lang="en-US"/>
+          </a:p>
+        </p:txBody>
+      </p:sp>
+    </p:spTree>
+    <p:extLst>
+      <p:ext uri="{BB962C8B-B14F-4D97-AF65-F5344CB8AC3E}">
+        <p14:creationId xmlns:p14="http://schemas.microsoft.com/office/powerpoint/2010/main" val="1870698217"/>
       </p:ext>
     </p:extLst>
   </p:cSld>
@@ -12709,7 +14282,7 @@
           <a:p>
             <a:r>
               <a:rPr lang="en-US" dirty="0"/>
-              <a:t>Example</a:t>
+              <a:t>Example of Markov Chain</a:t>
             </a:r>
           </a:p>
         </p:txBody>
@@ -14420,17 +15993,11 @@
               <p:cNvGraphicFramePr>
                 <a:graphicFrameLocks noGrp="1"/>
               </p:cNvGraphicFramePr>
-              <p:nvPr>
-                <p:extLst>
-                  <p:ext uri="{D42A27DB-BD31-4B8C-83A1-F6EECF244321}">
-                    <p14:modId xmlns:p14="http://schemas.microsoft.com/office/powerpoint/2010/main" val="92377705"/>
-                  </p:ext>
-                </p:extLst>
-              </p:nvPr>
+              <p:nvPr/>
             </p:nvGraphicFramePr>
             <p:xfrm>
-              <a:off x="4366330" y="2381884"/>
-              <a:ext cx="6332690" cy="3869251"/>
+              <a:off x="4366330" y="2603105"/>
+              <a:ext cx="6332690" cy="3686371"/>
             </p:xfrm>
             <a:graphic>
               <a:graphicData uri="http://schemas.openxmlformats.org/drawingml/2006/table">
@@ -16585,10 +18152,6 @@
                             <a:t>0.10</a:t>
                           </a:r>
                         </a:p>
-                        <a:p>
-                          <a:pPr algn="ctr"/>
-                          <a:endParaRPr lang="en-US" sz="1800" dirty="0"/>
-                        </a:p>
                       </a:txBody>
                       <a:tcPr>
                         <a:lnL w="12700" cap="flat" cmpd="sng" algn="ctr">
@@ -16842,10 +18405,9 @@
                         <a:p>
                           <a:pPr algn="ctr"/>
                           <a:r>
-                            <a:rPr lang="en-US" sz="1800"/>
-                            <a:t>0.25</a:t>
+                            <a:rPr lang="en-US" sz="1800" dirty="0"/>
+                            <a:t>0.0</a:t>
                           </a:r>
-                          <a:endParaRPr lang="en-US" sz="1800" dirty="0"/>
                         </a:p>
                       </a:txBody>
                       <a:tcPr>
@@ -18977,14 +20539,14 @@
               <p:nvPr>
                 <p:extLst>
                   <p:ext uri="{D42A27DB-BD31-4B8C-83A1-F6EECF244321}">
-                    <p14:modId xmlns:p14="http://schemas.microsoft.com/office/powerpoint/2010/main" val="92377705"/>
+                    <p14:modId xmlns:p14="http://schemas.microsoft.com/office/powerpoint/2010/main" val="3943909351"/>
                   </p:ext>
                 </p:extLst>
               </p:nvPr>
             </p:nvGraphicFramePr>
             <p:xfrm>
-              <a:off x="4366330" y="2381884"/>
-              <a:ext cx="6332690" cy="3869251"/>
+              <a:off x="4366330" y="2603105"/>
+              <a:ext cx="6332690" cy="3686371"/>
             </p:xfrm>
             <a:graphic>
               <a:graphicData uri="http://schemas.openxmlformats.org/drawingml/2006/table">
@@ -19155,7 +20717,7 @@
                         <a:blipFill>
                           <a:blip r:embed="rId8"/>
                           <a:stretch>
-                            <a:fillRect l="-101351" t="-1250" r="-503378" b="-713750"/>
+                            <a:fillRect l="-101351" t="-2500" r="-503378" b="-676250"/>
                           </a:stretch>
                         </a:blipFill>
                       </a:tcPr>
@@ -19216,7 +20778,7 @@
                         <a:blipFill>
                           <a:blip r:embed="rId8"/>
                           <a:stretch>
-                            <a:fillRect l="-200000" t="-1250" r="-400000" b="-713750"/>
+                            <a:fillRect l="-200000" t="-2500" r="-400000" b="-676250"/>
                           </a:stretch>
                         </a:blipFill>
                       </a:tcPr>
@@ -19277,7 +20839,7 @@
                         <a:blipFill>
                           <a:blip r:embed="rId8"/>
                           <a:stretch>
-                            <a:fillRect l="-302027" t="-1250" r="-302703" b="-713750"/>
+                            <a:fillRect l="-302027" t="-2500" r="-302703" b="-676250"/>
                           </a:stretch>
                         </a:blipFill>
                       </a:tcPr>
@@ -19338,7 +20900,7 @@
                         <a:blipFill>
                           <a:blip r:embed="rId8"/>
                           <a:stretch>
-                            <a:fillRect l="-399329" t="-1250" r="-200671" b="-713750"/>
+                            <a:fillRect l="-399329" t="-2500" r="-200671" b="-676250"/>
                           </a:stretch>
                         </a:blipFill>
                       </a:tcPr>
@@ -19399,7 +20961,7 @@
                         <a:blipFill>
                           <a:blip r:embed="rId8"/>
                           <a:stretch>
-                            <a:fillRect l="-502703" t="-1250" r="-102027" b="-713750"/>
+                            <a:fillRect l="-502703" t="-2500" r="-102027" b="-676250"/>
                           </a:stretch>
                         </a:blipFill>
                       </a:tcPr>
@@ -19460,7 +21022,7 @@
                         <a:blipFill>
                           <a:blip r:embed="rId8"/>
                           <a:stretch>
-                            <a:fillRect l="-598658" t="-1250" r="-1342" b="-713750"/>
+                            <a:fillRect l="-598658" t="-2500" r="-1342" b="-676250"/>
                           </a:stretch>
                         </a:blipFill>
                       </a:tcPr>
@@ -19528,7 +21090,7 @@
                         <a:blipFill>
                           <a:blip r:embed="rId8"/>
                           <a:stretch>
-                            <a:fillRect l="-671" t="-108000" r="-599329" b="-661333"/>
+                            <a:fillRect l="-671" t="-109333" r="-599329" b="-621333"/>
                           </a:stretch>
                         </a:blipFill>
                       </a:tcPr>
@@ -19996,7 +21558,7 @@
                         <a:blipFill>
                           <a:blip r:embed="rId8"/>
                           <a:stretch>
-                            <a:fillRect l="-671" t="-208000" r="-599329" b="-561333"/>
+                            <a:fillRect l="-671" t="-209333" r="-599329" b="-521333"/>
                           </a:stretch>
                         </a:blipFill>
                       </a:tcPr>
@@ -20407,7 +21969,7 @@
                       </a:ext>
                     </a:extLst>
                   </a:tr>
-                  <a:tr h="640080">
+                  <a:tr h="457200">
                     <a:tc>
                       <a:txBody>
                         <a:bodyPr/>
@@ -20464,7 +22026,7 @@
                         <a:blipFill>
                           <a:blip r:embed="rId8"/>
                           <a:stretch>
-                            <a:fillRect l="-671" t="-220000" r="-599329" b="-300952"/>
+                            <a:fillRect l="-671" t="-309333" r="-599329" b="-421333"/>
                           </a:stretch>
                         </a:blipFill>
                       </a:tcPr>
@@ -20576,10 +22138,6 @@
                             <a:t>0.10</a:t>
                           </a:r>
                         </a:p>
-                        <a:p>
-                          <a:pPr algn="ctr"/>
-                          <a:endParaRPr lang="en-US" sz="1800" dirty="0"/>
-                        </a:p>
                       </a:txBody>
                       <a:tcPr>
                         <a:lnL w="12700" cap="flat" cmpd="sng" algn="ctr">
@@ -20833,10 +22391,9 @@
                         <a:p>
                           <a:pPr algn="ctr"/>
                           <a:r>
-                            <a:rPr lang="en-US" sz="1800"/>
-                            <a:t>0.25</a:t>
+                            <a:rPr lang="en-US" sz="1800" dirty="0"/>
+                            <a:t>0.0</a:t>
                           </a:r>
-                          <a:endParaRPr lang="en-US" sz="1800" dirty="0"/>
                         </a:p>
                       </a:txBody>
                       <a:tcPr>
@@ -20954,7 +22511,7 @@
                         <a:blipFill>
                           <a:blip r:embed="rId8"/>
                           <a:stretch>
-                            <a:fillRect l="-671" t="-442105" r="-599329" b="-315789"/>
+                            <a:fillRect l="-671" t="-409333" r="-599329" b="-321333"/>
                           </a:stretch>
                         </a:blipFill>
                       </a:tcPr>
@@ -21423,7 +22980,7 @@
                         <a:blipFill>
                           <a:blip r:embed="rId8"/>
                           <a:stretch>
-                            <a:fillRect l="-671" t="-549333" r="-599329" b="-220000"/>
+                            <a:fillRect l="-671" t="-509333" r="-599329" b="-221333"/>
                           </a:stretch>
                         </a:blipFill>
                       </a:tcPr>
@@ -21909,7 +23466,7 @@
                         <a:blipFill>
                           <a:blip r:embed="rId8"/>
                           <a:stretch>
-                            <a:fillRect l="-671" t="-649333" r="-599329" b="-120000"/>
+                            <a:fillRect l="-671" t="-609333" r="-599329" b="-121333"/>
                           </a:stretch>
                         </a:blipFill>
                       </a:tcPr>
@@ -22361,7 +23918,7 @@
                         <a:blipFill>
                           <a:blip r:embed="rId8"/>
                           <a:stretch>
-                            <a:fillRect l="-671" t="-749333" r="-599329" b="-20000"/>
+                            <a:fillRect l="-671" t="-709333" r="-599329" b="-21333"/>
                           </a:stretch>
                         </a:blipFill>
                       </a:tcPr>
@@ -22762,66 +24319,294 @@
           </p:graphicFrame>
         </mc:Fallback>
       </mc:AlternateContent>
+      <mc:AlternateContent xmlns:mc="http://schemas.openxmlformats.org/markup-compatibility/2006" xmlns:a14="http://schemas.microsoft.com/office/drawing/2010/main">
+        <mc:Choice Requires="a14">
+          <p:sp>
+            <p:nvSpPr>
+              <p:cNvPr id="133" name="TextBox 132">
+                <a:extLst>
+                  <a:ext uri="{FF2B5EF4-FFF2-40B4-BE49-F238E27FC236}">
+                    <a16:creationId xmlns:a16="http://schemas.microsoft.com/office/drawing/2014/main" id="{9F559F03-E878-46EA-94C2-9AD36099EFDF}"/>
+                  </a:ext>
+                </a:extLst>
+              </p:cNvPr>
+              <p:cNvSpPr txBox="1"/>
+              <p:nvPr/>
+            </p:nvSpPr>
+            <p:spPr bwMode="gray">
+              <a:xfrm>
+                <a:off x="4366330" y="830716"/>
+                <a:ext cx="6715885" cy="1231316"/>
+              </a:xfrm>
+              <a:prstGeom prst="rect">
+                <a:avLst/>
+              </a:prstGeom>
+              <a:noFill/>
+            </p:spPr>
+            <p:txBody>
+              <a:bodyPr wrap="square" lIns="0" tIns="0" rIns="0" bIns="0" rtlCol="0">
+                <a:noAutofit/>
+              </a:bodyPr>
+              <a:lstStyle/>
+              <a:p>
+                <a:pPr>
+                  <a:spcBef>
+                    <a:spcPts val="300"/>
+                  </a:spcBef>
+                  <a:spcAft>
+                    <a:spcPts val="300"/>
+                  </a:spcAft>
+                  <a:buClr>
+                    <a:schemeClr val="accent1"/>
+                  </a:buClr>
+                  <a:buSzPct val="90000"/>
+                </a:pPr>
+                <a:r>
+                  <a:rPr lang="en-US" sz="2000" b="1" u="sng" dirty="0"/>
+                  <a:t>Markov matrix</a:t>
+                </a:r>
+                <a:r>
+                  <a:rPr lang="en-US" sz="2000" b="1" dirty="0"/>
+                  <a:t> </a:t>
+                </a:r>
+                <a14:m>
+                  <m:oMath xmlns:m="http://schemas.openxmlformats.org/officeDocument/2006/math">
+                    <m:r>
+                      <a:rPr lang="en-US" sz="2400" b="1" i="1" smtClean="0">
+                        <a:latin typeface="Cambria Math" panose="02040503050406030204" pitchFamily="18" charset="0"/>
+                      </a:rPr>
+                      <m:t>𝑴</m:t>
+                    </m:r>
+                  </m:oMath>
+                </a14:m>
+                <a:endParaRPr lang="en-US" sz="2000" b="1" dirty="0"/>
+              </a:p>
+              <a:p>
+                <a:pPr>
+                  <a:spcBef>
+                    <a:spcPts val="300"/>
+                  </a:spcBef>
+                  <a:spcAft>
+                    <a:spcPts val="300"/>
+                  </a:spcAft>
+                  <a:buClr>
+                    <a:schemeClr val="accent1"/>
+                  </a:buClr>
+                  <a:buSzPct val="90000"/>
+                </a:pPr>
+                <a:r>
+                  <a:rPr lang="en-US" dirty="0">
+                    <a:latin typeface="+mj-lt"/>
+                  </a:rPr>
+                  <a:t>Also called stochastic matrix or transition matrix)</a:t>
+                </a:r>
+              </a:p>
+              <a:p>
+                <a:pPr algn="l"/>
+                <a14:m>
+                  <m:oMath xmlns:m="http://schemas.openxmlformats.org/officeDocument/2006/math">
+                    <m:r>
+                      <a:rPr lang="en-US" sz="1600" b="0" i="1" u="none" strike="noStrike" baseline="0" smtClean="0">
+                        <a:solidFill>
+                          <a:srgbClr val="000000"/>
+                        </a:solidFill>
+                        <a:latin typeface="Cambria Math" panose="02040503050406030204" pitchFamily="18" charset="0"/>
+                      </a:rPr>
+                      <m:t>𝑀</m:t>
+                    </m:r>
+                  </m:oMath>
+                </a14:m>
+                <a:r>
+                  <a:rPr lang="en-US" sz="1600" b="0" i="0" u="none" strike="noStrike" baseline="0" dirty="0">
+                    <a:solidFill>
+                      <a:srgbClr val="000000"/>
+                    </a:solidFill>
+                    <a:latin typeface="+mj-lt"/>
+                  </a:rPr>
+                  <a:t> </a:t>
+                </a:r>
+                <a:r>
+                  <a:rPr lang="en-US" sz="1600" dirty="0">
+                    <a:solidFill>
+                      <a:srgbClr val="000000"/>
+                    </a:solidFill>
+                    <a:latin typeface="+mj-lt"/>
+                  </a:rPr>
+                  <a:t>is a square matrix </a:t>
+                </a:r>
+                <a:r>
+                  <a:rPr lang="en-US" sz="1600" b="0" i="0" u="none" strike="noStrike" baseline="0" dirty="0">
+                    <a:solidFill>
+                      <a:srgbClr val="000000"/>
+                    </a:solidFill>
+                    <a:latin typeface="+mj-lt"/>
+                  </a:rPr>
+                  <a:t>whose columns are probability vectors </a:t>
+                </a:r>
+                <a14:m>
+                  <m:oMath xmlns:m="http://schemas.openxmlformats.org/officeDocument/2006/math">
+                    <m:acc>
+                      <m:accPr>
+                        <m:chr m:val="⃗"/>
+                        <m:ctrlPr>
+                          <a:rPr lang="en-US" sz="2000" b="0" i="1" u="none" strike="noStrike" baseline="0" smtClean="0">
+                            <a:latin typeface="Cambria Math" panose="02040503050406030204" pitchFamily="18" charset="0"/>
+                          </a:rPr>
+                        </m:ctrlPr>
+                      </m:accPr>
+                      <m:e>
+                        <m:sSub>
+                          <m:sSubPr>
+                            <m:ctrlPr>
+                              <a:rPr lang="pt-BR" sz="2000" b="0" i="1" u="none" strike="noStrike" baseline="0" smtClean="0">
+                                <a:latin typeface="Cambria Math" panose="02040503050406030204" pitchFamily="18" charset="0"/>
+                              </a:rPr>
+                            </m:ctrlPr>
+                          </m:sSubPr>
+                          <m:e>
+                            <m:r>
+                              <a:rPr lang="pt-BR" sz="2000" b="0" i="1" u="none" strike="noStrike" baseline="0" smtClean="0">
+                                <a:latin typeface="Cambria Math" panose="02040503050406030204" pitchFamily="18" charset="0"/>
+                              </a:rPr>
+                              <m:t>𝑥</m:t>
+                            </m:r>
+                          </m:e>
+                          <m:sub>
+                            <m:r>
+                              <a:rPr lang="pt-BR" sz="2000" b="0" i="1" u="none" strike="noStrike" baseline="0" smtClean="0">
+                                <a:latin typeface="Cambria Math" panose="02040503050406030204" pitchFamily="18" charset="0"/>
+                              </a:rPr>
+                              <m:t>𝑡</m:t>
+                            </m:r>
+                          </m:sub>
+                        </m:sSub>
+                      </m:e>
+                    </m:acc>
+                  </m:oMath>
+                </a14:m>
+                <a:r>
+                  <a:rPr lang="en-US" sz="1600" b="0" i="0" u="none" strike="noStrike" baseline="0" dirty="0">
+                    <a:solidFill>
+                      <a:srgbClr val="000000"/>
+                    </a:solidFill>
+                    <a:latin typeface="+mj-lt"/>
+                  </a:rPr>
+                  <a:t>.</a:t>
+                </a:r>
+              </a:p>
+            </p:txBody>
+          </p:sp>
+        </mc:Choice>
+        <mc:Fallback xmlns="">
+          <p:sp>
+            <p:nvSpPr>
+              <p:cNvPr id="133" name="TextBox 132">
+                <a:extLst>
+                  <a:ext uri="{FF2B5EF4-FFF2-40B4-BE49-F238E27FC236}">
+                    <a16:creationId xmlns:a16="http://schemas.microsoft.com/office/drawing/2014/main" id="{9F559F03-E878-46EA-94C2-9AD36099EFDF}"/>
+                  </a:ext>
+                </a:extLst>
+              </p:cNvPr>
+              <p:cNvSpPr txBox="1">
+                <a:spLocks noRot="1" noChangeAspect="1" noMove="1" noResize="1" noEditPoints="1" noAdjustHandles="1" noChangeArrowheads="1" noChangeShapeType="1" noTextEdit="1"/>
+              </p:cNvSpPr>
+              <p:nvPr/>
+            </p:nvSpPr>
+            <p:spPr bwMode="gray">
+              <a:xfrm>
+                <a:off x="4366330" y="830716"/>
+                <a:ext cx="6715885" cy="1231316"/>
+              </a:xfrm>
+              <a:prstGeom prst="rect">
+                <a:avLst/>
+              </a:prstGeom>
+              <a:blipFill>
+                <a:blip r:embed="rId9"/>
+                <a:stretch>
+                  <a:fillRect l="-2269" t="-2475"/>
+                </a:stretch>
+              </a:blipFill>
+            </p:spPr>
+            <p:txBody>
+              <a:bodyPr/>
+              <a:lstStyle/>
+              <a:p>
+                <a:r>
+                  <a:rPr lang="en-US">
+                    <a:noFill/>
+                  </a:rPr>
+                  <a:t> </a:t>
+                </a:r>
+              </a:p>
+            </p:txBody>
+          </p:sp>
+        </mc:Fallback>
+      </mc:AlternateContent>
       <p:sp>
         <p:nvSpPr>
-          <p:cNvPr id="133" name="TextBox 132">
+          <p:cNvPr id="2" name="Rectangle 1">
             <a:extLst>
               <a:ext uri="{FF2B5EF4-FFF2-40B4-BE49-F238E27FC236}">
-                <a16:creationId xmlns:a16="http://schemas.microsoft.com/office/drawing/2014/main" id="{9F559F03-E878-46EA-94C2-9AD36099EFDF}"/>
+                <a16:creationId xmlns:a16="http://schemas.microsoft.com/office/drawing/2014/main" id="{4775E7A1-398C-4B8C-87C2-B91839BAEC66}"/>
               </a:ext>
             </a:extLst>
           </p:cNvPr>
-          <p:cNvSpPr txBox="1"/>
+          <p:cNvSpPr/>
           <p:nvPr/>
         </p:nvSpPr>
         <p:spPr bwMode="gray">
           <a:xfrm>
-            <a:off x="4366329" y="1054300"/>
-            <a:ext cx="6715885" cy="417834"/>
+            <a:off x="9724800" y="2449662"/>
+            <a:ext cx="1004758" cy="4164985"/>
           </a:xfrm>
           <a:prstGeom prst="rect">
             <a:avLst/>
           </a:prstGeom>
           <a:noFill/>
+          <a:ln>
+            <a:solidFill>
+              <a:schemeClr val="accent1"/>
+            </a:solidFill>
+          </a:ln>
         </p:spPr>
+        <p:style>
+          <a:lnRef idx="2">
+            <a:schemeClr val="accent1">
+              <a:shade val="50000"/>
+            </a:schemeClr>
+          </a:lnRef>
+          <a:fillRef idx="1">
+            <a:schemeClr val="accent1"/>
+          </a:fillRef>
+          <a:effectRef idx="0">
+            <a:schemeClr val="accent1"/>
+          </a:effectRef>
+          <a:fontRef idx="minor">
+            <a:schemeClr val="lt1"/>
+          </a:fontRef>
+        </p:style>
         <p:txBody>
-          <a:bodyPr wrap="square" lIns="0" tIns="0" rIns="0" bIns="0" rtlCol="0">
+          <a:bodyPr rot="0" spcFirstLastPara="0" vertOverflow="overflow" horzOverflow="overflow" vert="horz" wrap="square" lIns="108000" tIns="72000" rIns="108000" bIns="72000" numCol="1" spcCol="0" rtlCol="0" fromWordArt="0" anchor="ctr" anchorCtr="0" forceAA="0" compatLnSpc="1">
+            <a:prstTxWarp prst="textNoShape">
+              <a:avLst/>
+            </a:prstTxWarp>
             <a:noAutofit/>
           </a:bodyPr>
           <a:lstStyle/>
           <a:p>
-            <a:pPr>
+            <a:pPr algn="ctr">
               <a:spcBef>
                 <a:spcPts val="300"/>
               </a:spcBef>
               <a:spcAft>
                 <a:spcPts val="300"/>
               </a:spcAft>
-              <a:buClr>
-                <a:schemeClr val="accent1"/>
-              </a:buClr>
-              <a:buSzPct val="90000"/>
             </a:pPr>
-            <a:r>
-              <a:rPr lang="en-US" sz="2000" b="1" u="sng" dirty="0"/>
-              <a:t>Markov matrix </a:t>
-            </a:r>
-            <a:r>
-              <a:rPr lang="en-US" sz="2000" dirty="0"/>
-              <a:t>(or stochastic or transition matrix)</a:t>
-            </a:r>
-          </a:p>
-          <a:p>
-            <a:pPr algn="l"/>
-            <a:r>
-              <a:rPr lang="en-US" sz="1800" b="0" i="0" u="none" strike="noStrike" baseline="0" dirty="0">
-                <a:solidFill>
-                  <a:srgbClr val="000000"/>
-                </a:solidFill>
-                <a:latin typeface="CMSS10"/>
-              </a:rPr>
-              <a:t>square matrix whose columns are probability vectors.</a:t>
-            </a:r>
+            <a:endParaRPr lang="en-US" sz="1200" b="1" dirty="0" err="1">
+              <a:solidFill>
+                <a:schemeClr val="bg1"/>
+              </a:solidFill>
+            </a:endParaRPr>
           </a:p>
         </p:txBody>
       </p:sp>
@@ -22886,7 +24671,7 @@
         </p:nvSpPr>
         <p:spPr bwMode="gray">
           <a:xfrm>
-            <a:off x="6509201" y="2062032"/>
+            <a:off x="6509201" y="2283253"/>
             <a:ext cx="2046948" cy="389992"/>
           </a:xfrm>
           <a:prstGeom prst="rect">
@@ -22933,7 +24718,7 @@
         </p:nvSpPr>
         <p:spPr bwMode="gray">
           <a:xfrm rot="16200000">
-            <a:off x="3245329" y="4261260"/>
+            <a:off x="3245329" y="4482481"/>
             <a:ext cx="1792192" cy="295739"/>
           </a:xfrm>
           <a:prstGeom prst="rect">
@@ -23015,10 +24800,137 @@
           </a:fontRef>
         </p:style>
       </p:cxnSp>
+      <mc:AlternateContent xmlns:mc="http://schemas.openxmlformats.org/markup-compatibility/2006" xmlns:a14="http://schemas.microsoft.com/office/drawing/2010/main">
+        <mc:Choice Requires="a14">
+          <p:sp>
+            <p:nvSpPr>
+              <p:cNvPr id="34" name="TextBox 33">
+                <a:extLst>
+                  <a:ext uri="{FF2B5EF4-FFF2-40B4-BE49-F238E27FC236}">
+                    <a16:creationId xmlns:a16="http://schemas.microsoft.com/office/drawing/2014/main" id="{036D07EB-4D36-4E08-A01D-A10CC9730A53}"/>
+                  </a:ext>
+                </a:extLst>
+              </p:cNvPr>
+              <p:cNvSpPr txBox="1"/>
+              <p:nvPr/>
+            </p:nvSpPr>
+            <p:spPr bwMode="gray">
+              <a:xfrm>
+                <a:off x="9983978" y="1890796"/>
+                <a:ext cx="490382" cy="461665"/>
+              </a:xfrm>
+              <a:prstGeom prst="rect">
+                <a:avLst/>
+              </a:prstGeom>
+              <a:noFill/>
+            </p:spPr>
+            <p:txBody>
+              <a:bodyPr wrap="square">
+                <a:spAutoFit/>
+              </a:bodyPr>
+              <a:lstStyle/>
+              <a:p>
+                <a:pPr/>
+                <a14:m>
+                  <m:oMathPara xmlns:m="http://schemas.openxmlformats.org/officeDocument/2006/math">
+                    <m:oMathParaPr>
+                      <m:jc m:val="centerGroup"/>
+                    </m:oMathParaPr>
+                    <m:oMath xmlns:m="http://schemas.openxmlformats.org/officeDocument/2006/math">
+                      <m:acc>
+                        <m:accPr>
+                          <m:chr m:val="⃗"/>
+                          <m:ctrlPr>
+                            <a:rPr lang="en-US" sz="2400" b="0" i="1" u="none" strike="noStrike" baseline="0" smtClean="0">
+                              <a:latin typeface="Cambria Math" panose="02040503050406030204" pitchFamily="18" charset="0"/>
+                            </a:rPr>
+                          </m:ctrlPr>
+                        </m:accPr>
+                        <m:e>
+                          <m:sSub>
+                            <m:sSubPr>
+                              <m:ctrlPr>
+                                <a:rPr lang="pt-BR" sz="2400" b="0" i="1" u="none" strike="noStrike" baseline="0" smtClean="0">
+                                  <a:latin typeface="Cambria Math" panose="02040503050406030204" pitchFamily="18" charset="0"/>
+                                </a:rPr>
+                              </m:ctrlPr>
+                            </m:sSubPr>
+                            <m:e>
+                              <m:r>
+                                <a:rPr lang="pt-BR" sz="2400" b="0" i="1" u="none" strike="noStrike" baseline="0" smtClean="0">
+                                  <a:latin typeface="Cambria Math" panose="02040503050406030204" pitchFamily="18" charset="0"/>
+                                </a:rPr>
+                                <m:t>𝑥</m:t>
+                              </m:r>
+                            </m:e>
+                            <m:sub>
+                              <m:r>
+                                <a:rPr lang="pt-BR" sz="2400" b="0" i="1" u="none" strike="noStrike" baseline="0" smtClean="0">
+                                  <a:latin typeface="Cambria Math" panose="02040503050406030204" pitchFamily="18" charset="0"/>
+                                </a:rPr>
+                                <m:t>𝑡</m:t>
+                              </m:r>
+                            </m:sub>
+                          </m:sSub>
+                        </m:e>
+                      </m:acc>
+                    </m:oMath>
+                  </m:oMathPara>
+                </a14:m>
+                <a:endParaRPr lang="en-US" sz="2400" dirty="0"/>
+              </a:p>
+            </p:txBody>
+          </p:sp>
+        </mc:Choice>
+        <mc:Fallback xmlns="">
+          <p:sp>
+            <p:nvSpPr>
+              <p:cNvPr id="34" name="TextBox 33">
+                <a:extLst>
+                  <a:ext uri="{FF2B5EF4-FFF2-40B4-BE49-F238E27FC236}">
+                    <a16:creationId xmlns:a16="http://schemas.microsoft.com/office/drawing/2014/main" id="{036D07EB-4D36-4E08-A01D-A10CC9730A53}"/>
+                  </a:ext>
+                </a:extLst>
+              </p:cNvPr>
+              <p:cNvSpPr txBox="1">
+                <a:spLocks noRot="1" noChangeAspect="1" noMove="1" noResize="1" noEditPoints="1" noAdjustHandles="1" noChangeArrowheads="1" noChangeShapeType="1" noTextEdit="1"/>
+              </p:cNvSpPr>
+              <p:nvPr/>
+            </p:nvSpPr>
+            <p:spPr bwMode="gray">
+              <a:xfrm>
+                <a:off x="9983978" y="1890796"/>
+                <a:ext cx="490382" cy="461665"/>
+              </a:xfrm>
+              <a:prstGeom prst="rect">
+                <a:avLst/>
+              </a:prstGeom>
+              <a:blipFill>
+                <a:blip r:embed="rId10"/>
+                <a:stretch>
+                  <a:fillRect b="-3947"/>
+                </a:stretch>
+              </a:blipFill>
+            </p:spPr>
+            <p:txBody>
+              <a:bodyPr/>
+              <a:lstStyle/>
+              <a:p>
+                <a:r>
+                  <a:rPr lang="en-US">
+                    <a:noFill/>
+                  </a:rPr>
+                  <a:t> </a:t>
+                </a:r>
+              </a:p>
+            </p:txBody>
+          </p:sp>
+        </mc:Fallback>
+      </mc:AlternateContent>
     </p:spTree>
     <p:extLst>
       <p:ext uri="{BB962C8B-B14F-4D97-AF65-F5344CB8AC3E}">
-        <p14:creationId xmlns:p14="http://schemas.microsoft.com/office/powerpoint/2010/main" val="3412219747"/>
+        <p14:creationId xmlns:p14="http://schemas.microsoft.com/office/powerpoint/2010/main" val="2543439537"/>
       </p:ext>
     </p:extLst>
   </p:cSld>

</xml_diff>